<commit_message>
Completed the JS basics presentation frame.
</commit_message>
<xml_diff>
--- a/javascript_basics/Javascript Basics - basics.pptx
+++ b/javascript_basics/Javascript Basics - basics.pptx
@@ -5,38 +5,39 @@
     <p:sldMasterId id="2147483648" r:id="rId1"/>
   </p:sldMasterIdLst>
   <p:notesMasterIdLst>
-    <p:notesMasterId r:id="rId16"/>
+    <p:notesMasterId r:id="rId17"/>
   </p:notesMasterIdLst>
   <p:handoutMasterIdLst>
-    <p:handoutMasterId r:id="rId17"/>
+    <p:handoutMasterId r:id="rId18"/>
   </p:handoutMasterIdLst>
   <p:sldIdLst>
     <p:sldId id="256" r:id="rId2"/>
-    <p:sldId id="257" r:id="rId3"/>
-    <p:sldId id="258" r:id="rId4"/>
-    <p:sldId id="264" r:id="rId5"/>
-    <p:sldId id="265" r:id="rId6"/>
-    <p:sldId id="259" r:id="rId7"/>
-    <p:sldId id="266" r:id="rId8"/>
-    <p:sldId id="267" r:id="rId9"/>
-    <p:sldId id="268" r:id="rId10"/>
-    <p:sldId id="269" r:id="rId11"/>
-    <p:sldId id="260" r:id="rId12"/>
-    <p:sldId id="261" r:id="rId13"/>
-    <p:sldId id="262" r:id="rId14"/>
-    <p:sldId id="263" r:id="rId15"/>
+    <p:sldId id="258" r:id="rId3"/>
+    <p:sldId id="264" r:id="rId4"/>
+    <p:sldId id="265" r:id="rId5"/>
+    <p:sldId id="259" r:id="rId6"/>
+    <p:sldId id="266" r:id="rId7"/>
+    <p:sldId id="267" r:id="rId8"/>
+    <p:sldId id="268" r:id="rId9"/>
+    <p:sldId id="269" r:id="rId10"/>
+    <p:sldId id="270" r:id="rId11"/>
+    <p:sldId id="271" r:id="rId12"/>
+    <p:sldId id="272" r:id="rId13"/>
+    <p:sldId id="274" r:id="rId14"/>
+    <p:sldId id="273" r:id="rId15"/>
+    <p:sldId id="275" r:id="rId16"/>
   </p:sldIdLst>
   <p:sldSz cx="9144000" cy="6858000" type="screen4x3"/>
   <p:notesSz cx="6858000" cy="9144000"/>
   <p:embeddedFontLst>
     <p:embeddedFont>
       <p:font typeface="AA Zuehlke" panose="02000503060000020004" pitchFamily="2" charset="0"/>
-      <p:regular r:id="rId18"/>
-      <p:italic r:id="rId19"/>
+      <p:regular r:id="rId19"/>
+      <p:italic r:id="rId20"/>
     </p:embeddedFont>
   </p:embeddedFontLst>
   <p:custDataLst>
-    <p:tags r:id="rId20"/>
+    <p:tags r:id="rId21"/>
   </p:custDataLst>
   <p:defaultTextStyle>
     <a:defPPr>
@@ -139,23 +140,36 @@
         <p14:section name="Default Section" id="{3901B320-B04B-46E1-8380-17ACC93F6A05}">
           <p14:sldIdLst>
             <p14:sldId id="256"/>
-            <p14:sldId id="257"/>
             <p14:sldId id="258"/>
+          </p14:sldIdLst>
+        </p14:section>
+        <p14:section name="Types" id="{163AC601-3CA3-4FE1-B276-1E050665EA92}">
+          <p14:sldIdLst>
             <p14:sldId id="264"/>
             <p14:sldId id="265"/>
             <p14:sldId id="259"/>
+          </p14:sldIdLst>
+        </p14:section>
+        <p14:section name="Operators" id="{CC907239-0754-4E88-8BB6-22DC90CDEDA8}">
+          <p14:sldIdLst>
             <p14:sldId id="266"/>
             <p14:sldId id="267"/>
+            <p14:sldId id="268"/>
+            <p14:sldId id="269"/>
+            <p14:sldId id="270"/>
           </p14:sldIdLst>
         </p14:section>
-        <p14:section name="Untitled Section" id="{EDD43BE8-DE00-4ED0-9916-496207BE0BE7}">
+        <p14:section name="Flow control &amp; loops" id="{6D024B85-BF05-478C-810C-E5EE583A4C3C}">
           <p14:sldIdLst>
-            <p14:sldId id="268"/>
-            <p14:sldId id="269"/>
-            <p14:sldId id="260"/>
-            <p14:sldId id="261"/>
-            <p14:sldId id="262"/>
-            <p14:sldId id="263"/>
+            <p14:sldId id="271"/>
+            <p14:sldId id="272"/>
+            <p14:sldId id="274"/>
+          </p14:sldIdLst>
+        </p14:section>
+        <p14:section name="Scopes of variables" id="{B5E0EBA1-03E9-4B5F-BF84-B03920EDED8D}">
+          <p14:sldIdLst>
+            <p14:sldId id="273"/>
+            <p14:sldId id="275"/>
           </p14:sldIdLst>
         </p14:section>
       </p14:sectionLst>
@@ -303,7 +317,7 @@
               <a:rPr lang="de-DE" smtClean="0">
                 <a:latin typeface="AA Zuehlke" pitchFamily="2" charset="0"/>
               </a:rPr>
-              <a:t>14.08.2015</a:t>
+              <a:t>18.08.2015</a:t>
             </a:fld>
             <a:endParaRPr lang="de-DE">
               <a:latin typeface="AA Zuehlke" pitchFamily="2" charset="0"/>
@@ -481,7 +495,7 @@
             <a:fld id="{A6966AE6-B72D-4967-9CA3-8469D2863705}" type="datetimeFigureOut">
               <a:rPr lang="en-US" smtClean="0"/>
               <a:pPr/>
-              <a:t>8/14/2015</a:t>
+              <a:t>8/18/2015</a:t>
             </a:fld>
             <a:endParaRPr lang="en-US" dirty="0"/>
           </a:p>
@@ -5389,11 +5403,7 @@
           <a:p>
             <a:r>
               <a:rPr lang="en-US" dirty="0" smtClean="0"/>
-              <a:t>JavaScript </a:t>
-            </a:r>
-            <a:r>
-              <a:rPr lang="en-US" dirty="0" smtClean="0"/>
-              <a:t>Basics</a:t>
+              <a:t>JavaScript Basics</a:t>
             </a:r>
             <a:endParaRPr lang="en-US" dirty="0"/>
           </a:p>
@@ -5427,8 +5437,12 @@
           <a:lstStyle/>
           <a:p>
             <a:r>
+              <a:rPr lang="de-CH" dirty="0" err="1" smtClean="0"/>
+              <a:t>Javascript</a:t>
+            </a:r>
+            <a:r>
               <a:rPr lang="de-CH" smtClean="0"/>
-              <a:t>Javascript Basics | nesp, stmi, mabo</a:t>
+              <a:t> Basics | nesp, stmi, mabo</a:t>
             </a:r>
             <a:endParaRPr lang="de-CH" dirty="0"/>
           </a:p>
@@ -5530,43 +5544,176 @@
           <a:lstStyle/>
           <a:p>
             <a:r>
-              <a:rPr lang="en-US" dirty="0" smtClean="0"/>
-              <a:t>delete, in</a:t>
-            </a:r>
+              <a:rPr lang="en-US" b="1" dirty="0" err="1" smtClean="0"/>
+              <a:t>instanceof</a:t>
+            </a:r>
+            <a:endParaRPr lang="en-US" b="1" dirty="0"/>
+          </a:p>
+        </p:txBody>
+      </p:sp>
+      <p:sp>
+        <p:nvSpPr>
+          <p:cNvPr id="3" name="Content Placeholder 2"/>
+          <p:cNvSpPr>
+            <a:spLocks noGrp="1"/>
+          </p:cNvSpPr>
+          <p:nvPr>
+            <p:ph idx="1"/>
+          </p:nvPr>
+        </p:nvSpPr>
+        <p:spPr/>
+        <p:txBody>
+          <a:bodyPr/>
+          <a:lstStyle/>
+          <a:p>
+            <a:pPr marL="342900" indent="-342900">
+              <a:buFont typeface="Arial" panose="020B0604020202020204" pitchFamily="34" charset="0"/>
+              <a:buChar char="•"/>
+            </a:pPr>
+            <a:r>
+              <a:rPr lang="en-US" dirty="0" smtClean="0"/>
+              <a:t>Checks if an object is in the prototype chain of a constructor</a:t>
+            </a:r>
+          </a:p>
+          <a:p>
+            <a:pPr marL="342900" indent="-342900">
+              <a:buFont typeface="Arial" panose="020B0604020202020204" pitchFamily="34" charset="0"/>
+              <a:buChar char="•"/>
+            </a:pPr>
+            <a:r>
+              <a:rPr lang="en-US" dirty="0" smtClean="0"/>
+              <a:t>If an object inherits a certain (anywhere in hierarchy)</a:t>
+            </a:r>
+          </a:p>
+          <a:p>
+            <a:pPr marL="342900" indent="-342900">
+              <a:buFont typeface="Arial" panose="020B0604020202020204" pitchFamily="34" charset="0"/>
+              <a:buChar char="•"/>
+            </a:pPr>
+            <a:endParaRPr lang="en-US" dirty="0" smtClean="0"/>
+          </a:p>
+          <a:p>
+            <a:pPr marL="342900" indent="-342900">
+              <a:buFont typeface="Arial" panose="020B0604020202020204" pitchFamily="34" charset="0"/>
+              <a:buChar char="•"/>
+            </a:pPr>
+            <a:r>
+              <a:rPr lang="en-US" dirty="0" smtClean="0"/>
+              <a:t>object </a:t>
+            </a:r>
+            <a:r>
+              <a:rPr lang="en-US" b="1" dirty="0" err="1"/>
+              <a:t>instanceof</a:t>
+            </a:r>
+            <a:r>
+              <a:rPr lang="en-US" dirty="0"/>
+              <a:t> </a:t>
+            </a:r>
+            <a:r>
+              <a:rPr lang="en-US" dirty="0" smtClean="0"/>
+              <a:t>constructor</a:t>
+            </a:r>
+          </a:p>
+          <a:p>
             <a:endParaRPr lang="en-US" dirty="0"/>
           </a:p>
-        </p:txBody>
-      </p:sp>
-      <p:sp>
-        <p:nvSpPr>
-          <p:cNvPr id="3" name="Content Placeholder 2"/>
-          <p:cNvSpPr>
-            <a:spLocks noGrp="1"/>
-          </p:cNvSpPr>
-          <p:nvPr>
-            <p:ph idx="1"/>
-          </p:nvPr>
-        </p:nvSpPr>
-        <p:spPr/>
-        <p:txBody>
-          <a:bodyPr/>
-          <a:lstStyle/>
-          <a:p>
+          <a:p>
+            <a:pPr>
+              <a:spcBef>
+                <a:spcPts val="0"/>
+              </a:spcBef>
+            </a:pPr>
+            <a:r>
+              <a:rPr lang="en-US" dirty="0" err="1"/>
+              <a:t>var</a:t>
+            </a:r>
             <a:r>
               <a:rPr lang="en-US" dirty="0"/>
-              <a:t>delete </a:t>
+              <a:t> </a:t>
             </a:r>
             <a:r>
               <a:rPr lang="en-US" dirty="0" err="1"/>
-              <a:t>object.property</a:t>
-            </a:r>
+              <a:t>myDate</a:t>
+            </a:r>
+            <a:r>
+              <a:rPr lang="en-US" dirty="0"/>
+              <a:t> </a:t>
+            </a:r>
+            <a:r>
+              <a:rPr lang="en-US" dirty="0" smtClean="0"/>
+              <a:t> </a:t>
+            </a:r>
+            <a:r>
+              <a:rPr lang="en-US" dirty="0"/>
+              <a:t>= new Date</a:t>
+            </a:r>
+            <a:r>
+              <a:rPr lang="en-US" dirty="0" smtClean="0"/>
+              <a:t>();</a:t>
+            </a:r>
+          </a:p>
+          <a:p>
+            <a:pPr>
+              <a:spcBef>
+                <a:spcPts val="0"/>
+              </a:spcBef>
+            </a:pPr>
+            <a:r>
+              <a:rPr lang="en-US" dirty="0" smtClean="0"/>
+              <a:t>if (</a:t>
+            </a:r>
+            <a:r>
+              <a:rPr lang="en-US" dirty="0" err="1" smtClean="0"/>
+              <a:t>myDate</a:t>
+            </a:r>
+            <a:r>
+              <a:rPr lang="en-US" dirty="0" smtClean="0"/>
+              <a:t> </a:t>
+            </a:r>
+            <a:r>
+              <a:rPr lang="en-US" dirty="0" err="1"/>
+              <a:t>instanceof</a:t>
+            </a:r>
+            <a:r>
+              <a:rPr lang="en-US" dirty="0"/>
+              <a:t> </a:t>
+            </a:r>
+            <a:r>
+              <a:rPr lang="en-US" dirty="0" smtClean="0"/>
+              <a:t>Date) {</a:t>
+            </a:r>
+          </a:p>
+          <a:p>
+            <a:pPr>
+              <a:spcBef>
+                <a:spcPts val="0"/>
+              </a:spcBef>
+            </a:pPr>
+            <a:r>
+              <a:rPr lang="en-US" dirty="0"/>
+              <a:t>	</a:t>
+            </a:r>
+            <a:r>
+              <a:rPr lang="en-US" dirty="0" smtClean="0"/>
+              <a:t>// is true</a:t>
+            </a:r>
+          </a:p>
+          <a:p>
+            <a:pPr>
+              <a:spcBef>
+                <a:spcPts val="0"/>
+              </a:spcBef>
+            </a:pPr>
+            <a:r>
+              <a:rPr lang="en-US" dirty="0"/>
+              <a:t>}</a:t>
+            </a:r>
+            <a:endParaRPr lang="en-US" dirty="0" smtClean="0"/>
+          </a:p>
+          <a:p>
             <a:endParaRPr lang="en-US" dirty="0"/>
           </a:p>
           <a:p>
-            <a:r>
-              <a:rPr lang="en-US"/>
-              <a:t>delete object['property']</a:t>
-            </a:r>
             <a:endParaRPr lang="en-US" dirty="0"/>
           </a:p>
         </p:txBody>
@@ -5733,18 +5880,145 @@
           <a:bodyPr/>
           <a:lstStyle/>
           <a:p>
+            <a:r>
+              <a:rPr lang="en-US" dirty="0" smtClean="0"/>
+              <a:t>Flow control &amp; loops</a:t>
+            </a:r>
             <a:endParaRPr lang="en-US" dirty="0"/>
           </a:p>
         </p:txBody>
       </p:sp>
       <p:sp>
         <p:nvSpPr>
-          <p:cNvPr id="5" name="Text Placeholder 4"/>
-          <p:cNvSpPr>
-            <a:spLocks noGrp="1"/>
-          </p:cNvSpPr>
-          <p:nvPr>
-            <p:ph type="body" sz="quarter" idx="13"/>
+          <p:cNvPr id="3" name="Content Placeholder 2"/>
+          <p:cNvSpPr>
+            <a:spLocks noGrp="1"/>
+          </p:cNvSpPr>
+          <p:nvPr>
+            <p:ph idx="1"/>
+          </p:nvPr>
+        </p:nvSpPr>
+        <p:spPr>
+          <a:xfrm>
+            <a:off x="579438" y="1052737"/>
+            <a:ext cx="8412161" cy="5513164"/>
+          </a:xfrm>
+        </p:spPr>
+        <p:txBody>
+          <a:bodyPr/>
+          <a:lstStyle/>
+          <a:p>
+            <a:pPr marL="342900" indent="-342900">
+              <a:buFont typeface="Arial" panose="020B0604020202020204" pitchFamily="34" charset="0"/>
+              <a:buChar char="•"/>
+            </a:pPr>
+            <a:r>
+              <a:rPr lang="en-US" dirty="0" smtClean="0"/>
+              <a:t>Flow control:</a:t>
+            </a:r>
+          </a:p>
+          <a:p>
+            <a:pPr marL="608013" lvl="1" indent="-342900">
+              <a:buFont typeface="Arial" panose="020B0604020202020204" pitchFamily="34" charset="0"/>
+              <a:buChar char="•"/>
+            </a:pPr>
+            <a:r>
+              <a:rPr lang="en-US" dirty="0" smtClean="0"/>
+              <a:t>if…else (remember == vs ===)</a:t>
+            </a:r>
+          </a:p>
+          <a:p>
+            <a:pPr marL="608013" lvl="1" indent="-342900">
+              <a:buFont typeface="Arial" panose="020B0604020202020204" pitchFamily="34" charset="0"/>
+              <a:buChar char="•"/>
+            </a:pPr>
+            <a:r>
+              <a:rPr lang="en-US" dirty="0" smtClean="0"/>
+              <a:t>switch</a:t>
+            </a:r>
+          </a:p>
+          <a:p>
+            <a:pPr marL="608013" lvl="1" indent="-342900">
+              <a:buFont typeface="Arial" panose="020B0604020202020204" pitchFamily="34" charset="0"/>
+              <a:buChar char="•"/>
+            </a:pPr>
+            <a:r>
+              <a:rPr lang="en-US" dirty="0" smtClean="0"/>
+              <a:t>?:</a:t>
+            </a:r>
+          </a:p>
+          <a:p>
+            <a:pPr marL="608013" lvl="1" indent="-342900">
+              <a:buFont typeface="Arial" panose="020B0604020202020204" pitchFamily="34" charset="0"/>
+              <a:buChar char="•"/>
+            </a:pPr>
+            <a:endParaRPr lang="en-US" dirty="0" smtClean="0"/>
+          </a:p>
+          <a:p>
+            <a:pPr marL="342900" indent="-342900">
+              <a:buFont typeface="Arial" panose="020B0604020202020204" pitchFamily="34" charset="0"/>
+              <a:buChar char="•"/>
+            </a:pPr>
+            <a:r>
+              <a:rPr lang="en-US" dirty="0" smtClean="0"/>
+              <a:t>Loops: for, while, do…while</a:t>
+            </a:r>
+          </a:p>
+          <a:p>
+            <a:pPr marL="342900" indent="-342900">
+              <a:buFont typeface="Arial" panose="020B0604020202020204" pitchFamily="34" charset="0"/>
+              <a:buChar char="•"/>
+            </a:pPr>
+            <a:endParaRPr lang="en-US" dirty="0" smtClean="0"/>
+          </a:p>
+          <a:p>
+            <a:pPr marL="342900" indent="-342900">
+              <a:buFont typeface="Arial" panose="020B0604020202020204" pitchFamily="34" charset="0"/>
+              <a:buChar char="•"/>
+            </a:pPr>
+            <a:r>
+              <a:rPr lang="en-US" dirty="0" smtClean="0"/>
+              <a:t>Exception handling:</a:t>
+            </a:r>
+          </a:p>
+          <a:p>
+            <a:pPr marL="608013" lvl="1" indent="-342900">
+              <a:buFont typeface="Arial" panose="020B0604020202020204" pitchFamily="34" charset="0"/>
+              <a:buChar char="•"/>
+            </a:pPr>
+            <a:r>
+              <a:rPr lang="en-US" dirty="0" smtClean="0"/>
+              <a:t>throw, try…catch…finally</a:t>
+            </a:r>
+          </a:p>
+          <a:p>
+            <a:pPr marL="608013" lvl="1" indent="-342900">
+              <a:buFont typeface="Arial" panose="020B0604020202020204" pitchFamily="34" charset="0"/>
+              <a:buChar char="•"/>
+            </a:pPr>
+            <a:endParaRPr lang="en-US" dirty="0"/>
+          </a:p>
+          <a:p>
+            <a:pPr marL="342900" indent="-342900">
+              <a:buFont typeface="Arial" panose="020B0604020202020204" pitchFamily="34" charset="0"/>
+              <a:buChar char="•"/>
+            </a:pPr>
+            <a:r>
+              <a:rPr lang="en-US" dirty="0" smtClean="0"/>
+              <a:t>Promises (when doing asynchronous work)</a:t>
+            </a:r>
+            <a:endParaRPr lang="en-US" dirty="0"/>
+          </a:p>
+        </p:txBody>
+      </p:sp>
+      <p:sp>
+        <p:nvSpPr>
+          <p:cNvPr id="4" name="Date Placeholder 3"/>
+          <p:cNvSpPr>
+            <a:spLocks noGrp="1"/>
+          </p:cNvSpPr>
+          <p:nvPr>
+            <p:ph type="dt" sz="half" idx="10"/>
           </p:nvPr>
         </p:nvSpPr>
         <p:spPr/>
@@ -5752,142 +6026,93 @@
           <a:bodyPr/>
           <a:lstStyle/>
           <a:p>
+            <a:r>
+              <a:rPr lang="en-US" dirty="0" smtClean="0"/>
+              <a:t>14. August 2015</a:t>
+            </a:r>
             <a:endParaRPr lang="en-US" dirty="0"/>
           </a:p>
         </p:txBody>
       </p:sp>
       <p:sp>
         <p:nvSpPr>
-          <p:cNvPr id="6" name="Picture Placeholder 5"/>
-          <p:cNvSpPr>
-            <a:spLocks noGrp="1"/>
-          </p:cNvSpPr>
-          <p:nvPr>
-            <p:ph type="pic" sz="quarter" idx="14"/>
+          <p:cNvPr id="7" name="Footer Placeholder 6"/>
+          <p:cNvSpPr>
+            <a:spLocks noGrp="1"/>
+          </p:cNvSpPr>
+          <p:nvPr>
+            <p:ph type="ftr" sz="quarter" idx="11"/>
           </p:nvPr>
         </p:nvSpPr>
         <p:spPr/>
-      </p:sp>
-      <p:sp>
-        <p:nvSpPr>
-          <p:cNvPr id="7" name="Picture Placeholder 6"/>
-          <p:cNvSpPr>
-            <a:spLocks noGrp="1"/>
-          </p:cNvSpPr>
-          <p:nvPr>
-            <p:ph type="pic" sz="quarter" idx="15"/>
+        <p:txBody>
+          <a:bodyPr/>
+          <a:lstStyle/>
+          <a:p>
+            <a:r>
+              <a:rPr lang="en-US" dirty="0" err="1" smtClean="0"/>
+              <a:t>Javascript</a:t>
+            </a:r>
+            <a:r>
+              <a:rPr lang="en-US" dirty="0" smtClean="0"/>
+              <a:t> Basics | </a:t>
+            </a:r>
+            <a:r>
+              <a:rPr lang="en-US" dirty="0" err="1" smtClean="0"/>
+              <a:t>nesp</a:t>
+            </a:r>
+            <a:r>
+              <a:rPr lang="en-US" dirty="0" smtClean="0"/>
+              <a:t>, </a:t>
+            </a:r>
+            <a:r>
+              <a:rPr lang="en-US" dirty="0" err="1" smtClean="0"/>
+              <a:t>stmi</a:t>
+            </a:r>
+            <a:r>
+              <a:rPr lang="en-US" dirty="0" smtClean="0"/>
+              <a:t>, </a:t>
+            </a:r>
+            <a:r>
+              <a:rPr lang="en-US" dirty="0" err="1" smtClean="0"/>
+              <a:t>mabo</a:t>
+            </a:r>
+            <a:endParaRPr lang="en-US" dirty="0"/>
+          </a:p>
+        </p:txBody>
+      </p:sp>
+      <p:sp>
+        <p:nvSpPr>
+          <p:cNvPr id="9" name="Slide Number Placeholder 8"/>
+          <p:cNvSpPr>
+            <a:spLocks noGrp="1"/>
+          </p:cNvSpPr>
+          <p:nvPr>
+            <p:ph type="sldNum" sz="quarter" idx="12"/>
           </p:nvPr>
         </p:nvSpPr>
         <p:spPr/>
-      </p:sp>
-      <p:sp>
-        <p:nvSpPr>
-          <p:cNvPr id="8" name="Picture Placeholder 7"/>
-          <p:cNvSpPr>
-            <a:spLocks noGrp="1"/>
-          </p:cNvSpPr>
-          <p:nvPr>
-            <p:ph type="pic" sz="quarter" idx="16"/>
-          </p:nvPr>
-        </p:nvSpPr>
-        <p:spPr/>
-      </p:sp>
-      <p:sp>
-        <p:nvSpPr>
-          <p:cNvPr id="9" name="Content Placeholder 8"/>
-          <p:cNvSpPr>
-            <a:spLocks noGrp="1"/>
-          </p:cNvSpPr>
-          <p:nvPr>
-            <p:ph idx="1"/>
-          </p:nvPr>
-        </p:nvSpPr>
-        <p:spPr/>
         <p:txBody>
           <a:bodyPr/>
           <a:lstStyle/>
           <a:p>
-            <a:endParaRPr lang="en-US" dirty="0"/>
-          </a:p>
-        </p:txBody>
-      </p:sp>
-      <p:sp>
-        <p:nvSpPr>
-          <p:cNvPr id="12" name="Footer Placeholder 11"/>
-          <p:cNvSpPr>
-            <a:spLocks noGrp="1"/>
-          </p:cNvSpPr>
-          <p:nvPr>
-            <p:ph type="ftr" sz="quarter" idx="11"/>
-          </p:nvPr>
-        </p:nvSpPr>
-        <p:spPr/>
-        <p:txBody>
-          <a:bodyPr/>
-          <a:lstStyle/>
-          <a:p>
-            <a:r>
-              <a:rPr lang="de-CH" smtClean="0"/>
-              <a:t>Javascript Basics | nesp, stmi, mabo</a:t>
-            </a:r>
-            <a:endParaRPr lang="de-CH" dirty="0"/>
-          </a:p>
-        </p:txBody>
-      </p:sp>
-      <p:sp>
-        <p:nvSpPr>
-          <p:cNvPr id="13" name="Date Placeholder 12"/>
-          <p:cNvSpPr>
-            <a:spLocks noGrp="1"/>
-          </p:cNvSpPr>
-          <p:nvPr>
-            <p:ph type="dt" sz="half" idx="10"/>
-          </p:nvPr>
-        </p:nvSpPr>
-        <p:spPr/>
-        <p:txBody>
-          <a:bodyPr/>
-          <a:lstStyle/>
-          <a:p>
-            <a:r>
-              <a:rPr lang="de-CH" smtClean="0"/>
-              <a:t>14. August 2015</a:t>
-            </a:r>
-            <a:endParaRPr lang="de-CH" dirty="0"/>
-          </a:p>
-        </p:txBody>
-      </p:sp>
-      <p:sp>
-        <p:nvSpPr>
-          <p:cNvPr id="14" name="Slide Number Placeholder 13"/>
-          <p:cNvSpPr>
-            <a:spLocks noGrp="1"/>
-          </p:cNvSpPr>
-          <p:nvPr>
-            <p:ph type="sldNum" sz="quarter" idx="12"/>
-          </p:nvPr>
-        </p:nvSpPr>
-        <p:spPr/>
-        <p:txBody>
-          <a:bodyPr/>
-          <a:lstStyle/>
-          <a:p>
-            <a:r>
-              <a:rPr lang="de-CH" smtClean="0"/>
+            <a:r>
+              <a:rPr lang="en-GB" smtClean="0"/>
               <a:t>Slide </a:t>
             </a:r>
-            <a:fld id="{D8C597D2-6297-4098-AF78-F6D132CC1ED5}" type="slidenum">
-              <a:rPr lang="de-CH" smtClean="0"/>
+            <a:fld id="{B945A87F-2CE4-4B6D-B6BF-F6BF6C5CB292}" type="slidenum">
+              <a:rPr smtClean="0"/>
+              <a:pPr/>
               <a:t>11</a:t>
             </a:fld>
-            <a:endParaRPr lang="de-CH" dirty="0"/>
+            <a:endParaRPr dirty="0"/>
           </a:p>
         </p:txBody>
       </p:sp>
     </p:spTree>
     <p:extLst>
       <p:ext uri="{BB962C8B-B14F-4D97-AF65-F5344CB8AC3E}">
-        <p14:creationId xmlns:p14="http://schemas.microsoft.com/office/powerpoint/2010/main" val="3821337236"/>
+        <p14:creationId xmlns:p14="http://schemas.microsoft.com/office/powerpoint/2010/main" val="2884851122"/>
       </p:ext>
     </p:extLst>
   </p:cSld>
@@ -5929,18 +6154,272 @@
           <a:bodyPr/>
           <a:lstStyle/>
           <a:p>
+            <a:r>
+              <a:rPr lang="en-US" b="1" dirty="0"/>
+              <a:t>f</a:t>
+            </a:r>
+            <a:r>
+              <a:rPr lang="en-US" b="1" dirty="0" smtClean="0"/>
+              <a:t>or</a:t>
+            </a:r>
+            <a:r>
+              <a:rPr lang="en-US" dirty="0" smtClean="0"/>
+              <a:t> vs </a:t>
+            </a:r>
+            <a:r>
+              <a:rPr lang="en-US" b="1" dirty="0" err="1" smtClean="0"/>
+              <a:t>forEach</a:t>
+            </a:r>
+            <a:r>
+              <a:rPr lang="en-US" b="1" dirty="0" smtClean="0"/>
+              <a:t>()</a:t>
+            </a:r>
+            <a:r>
+              <a:rPr lang="en-US" dirty="0" smtClean="0"/>
+              <a:t> vs </a:t>
+            </a:r>
+            <a:r>
+              <a:rPr lang="en-US" b="1" dirty="0" smtClean="0"/>
+              <a:t>for</a:t>
+            </a:r>
+            <a:r>
+              <a:rPr lang="en-US" dirty="0" smtClean="0"/>
+              <a:t>-</a:t>
+            </a:r>
+            <a:r>
+              <a:rPr lang="en-US" b="1" dirty="0" smtClean="0"/>
+              <a:t>in</a:t>
+            </a:r>
+            <a:endParaRPr lang="en-US" b="1" dirty="0"/>
+          </a:p>
+        </p:txBody>
+      </p:sp>
+      <p:sp>
+        <p:nvSpPr>
+          <p:cNvPr id="3" name="Content Placeholder 2"/>
+          <p:cNvSpPr>
+            <a:spLocks noGrp="1"/>
+          </p:cNvSpPr>
+          <p:nvPr>
+            <p:ph idx="1"/>
+          </p:nvPr>
+        </p:nvSpPr>
+        <p:spPr/>
+        <p:txBody>
+          <a:bodyPr/>
+          <a:lstStyle/>
+          <a:p>
+            <a:r>
+              <a:rPr lang="en-GB" dirty="0"/>
+              <a:t>for (</a:t>
+            </a:r>
+            <a:r>
+              <a:rPr lang="en-GB" dirty="0" err="1"/>
+              <a:t>i</a:t>
+            </a:r>
+            <a:r>
+              <a:rPr lang="en-GB" dirty="0"/>
+              <a:t> = 0; </a:t>
+            </a:r>
+            <a:r>
+              <a:rPr lang="en-GB" dirty="0" err="1"/>
+              <a:t>i</a:t>
+            </a:r>
+            <a:r>
+              <a:rPr lang="en-GB" dirty="0"/>
+              <a:t> &lt; </a:t>
+            </a:r>
+            <a:r>
+              <a:rPr lang="en-GB" dirty="0" err="1" smtClean="0"/>
+              <a:t>array.length</a:t>
+            </a:r>
+            <a:r>
+              <a:rPr lang="en-GB" dirty="0"/>
+              <a:t>; </a:t>
+            </a:r>
+            <a:r>
+              <a:rPr lang="en-GB" dirty="0" err="1"/>
+              <a:t>i</a:t>
+            </a:r>
+            <a:r>
+              <a:rPr lang="en-GB" dirty="0"/>
+              <a:t>++) { </a:t>
+            </a:r>
+            <a:r>
+              <a:rPr lang="en-GB" dirty="0"/>
+              <a:t/>
+            </a:r>
+            <a:br>
+              <a:rPr lang="en-GB" dirty="0"/>
+            </a:br>
+            <a:r>
+              <a:rPr lang="en-GB" dirty="0"/>
+              <a:t>    text += </a:t>
+            </a:r>
+            <a:r>
+              <a:rPr lang="en-GB" dirty="0" smtClean="0"/>
+              <a:t>array[</a:t>
+            </a:r>
+            <a:r>
+              <a:rPr lang="en-GB" dirty="0" err="1" smtClean="0"/>
+              <a:t>i</a:t>
+            </a:r>
+            <a:r>
+              <a:rPr lang="en-GB" dirty="0" smtClean="0"/>
+              <a:t>];</a:t>
+            </a:r>
+            <a:r>
+              <a:rPr lang="en-GB" dirty="0"/>
+              <a:t/>
+            </a:r>
+            <a:br>
+              <a:rPr lang="en-GB" dirty="0"/>
+            </a:br>
+            <a:r>
+              <a:rPr lang="en-GB" dirty="0" smtClean="0"/>
+              <a:t>}</a:t>
+            </a:r>
+          </a:p>
+          <a:p>
+            <a:endParaRPr lang="en-GB" dirty="0" smtClean="0"/>
+          </a:p>
+          <a:p>
+            <a:pPr>
+              <a:spcBef>
+                <a:spcPts val="0"/>
+              </a:spcBef>
+            </a:pPr>
+            <a:r>
+              <a:rPr lang="en-GB" dirty="0" smtClean="0"/>
+              <a:t>array.</a:t>
+            </a:r>
+            <a:r>
+              <a:rPr lang="en-US" dirty="0" err="1" smtClean="0"/>
+              <a:t>forEach</a:t>
+            </a:r>
+            <a:r>
+              <a:rPr lang="en-US" dirty="0" smtClean="0"/>
+              <a:t>(</a:t>
+            </a:r>
+            <a:r>
+              <a:rPr lang="en-GB" dirty="0"/>
+              <a:t>function (value, index, </a:t>
+            </a:r>
+            <a:r>
+              <a:rPr lang="en-GB" dirty="0" err="1" smtClean="0"/>
+              <a:t>arr</a:t>
+            </a:r>
+            <a:r>
+              <a:rPr lang="en-GB" dirty="0" smtClean="0"/>
+              <a:t>) </a:t>
+            </a:r>
+            <a:r>
+              <a:rPr lang="en-GB" dirty="0"/>
+              <a:t>{</a:t>
+            </a:r>
+          </a:p>
+          <a:p>
+            <a:pPr>
+              <a:spcBef>
+                <a:spcPts val="0"/>
+              </a:spcBef>
+            </a:pPr>
+            <a:r>
+              <a:rPr lang="en-GB" dirty="0"/>
+              <a:t> </a:t>
+            </a:r>
+            <a:r>
+              <a:rPr lang="en-GB" dirty="0" smtClean="0"/>
+              <a:t>     text </a:t>
+            </a:r>
+            <a:r>
+              <a:rPr lang="en-GB" dirty="0"/>
+              <a:t>+= value</a:t>
+            </a:r>
+            <a:r>
+              <a:rPr lang="en-GB" dirty="0" smtClean="0"/>
+              <a:t>;</a:t>
+            </a:r>
+            <a:endParaRPr lang="en-GB" dirty="0"/>
+          </a:p>
+          <a:p>
+            <a:pPr>
+              <a:spcBef>
+                <a:spcPts val="0"/>
+              </a:spcBef>
+            </a:pPr>
+            <a:r>
+              <a:rPr lang="en-GB" dirty="0" smtClean="0"/>
+              <a:t>}</a:t>
+            </a:r>
+            <a:r>
+              <a:rPr lang="en-US" dirty="0" smtClean="0"/>
+              <a:t>);</a:t>
+            </a:r>
+          </a:p>
+          <a:p>
+            <a:pPr>
+              <a:spcBef>
+                <a:spcPts val="0"/>
+              </a:spcBef>
+            </a:pPr>
             <a:endParaRPr lang="en-US" dirty="0"/>
           </a:p>
-        </p:txBody>
-      </p:sp>
-      <p:sp>
-        <p:nvSpPr>
-          <p:cNvPr id="3" name="Content Placeholder 2"/>
-          <p:cNvSpPr>
-            <a:spLocks noGrp="1"/>
-          </p:cNvSpPr>
-          <p:nvPr>
-            <p:ph idx="1"/>
+          <a:p>
+            <a:pPr>
+              <a:spcBef>
+                <a:spcPts val="0"/>
+              </a:spcBef>
+            </a:pPr>
+            <a:endParaRPr lang="en-US" dirty="0" smtClean="0"/>
+          </a:p>
+          <a:p>
+            <a:pPr marL="342900" indent="-342900">
+              <a:spcBef>
+                <a:spcPts val="0"/>
+              </a:spcBef>
+              <a:buFont typeface="Arial" panose="020B0604020202020204" pitchFamily="34" charset="0"/>
+              <a:buChar char="•"/>
+            </a:pPr>
+            <a:r>
+              <a:rPr lang="en-US" dirty="0" smtClean="0"/>
+              <a:t>for…in iterating through properties on an object</a:t>
+            </a:r>
+          </a:p>
+          <a:p>
+            <a:pPr>
+              <a:spcBef>
+                <a:spcPts val="0"/>
+              </a:spcBef>
+            </a:pPr>
+            <a:r>
+              <a:rPr lang="en-US" dirty="0"/>
+              <a:t>for </a:t>
+            </a:r>
+            <a:r>
+              <a:rPr lang="en-US" dirty="0" smtClean="0"/>
+              <a:t>(property in </a:t>
+            </a:r>
+            <a:r>
+              <a:rPr lang="en-US" dirty="0"/>
+              <a:t>object) </a:t>
+            </a:r>
+            <a:r>
+              <a:rPr lang="en-US" dirty="0" smtClean="0"/>
+              <a:t>{}</a:t>
+            </a:r>
+            <a:endParaRPr lang="en-US" dirty="0"/>
+          </a:p>
+        </p:txBody>
+      </p:sp>
+      <p:sp>
+        <p:nvSpPr>
+          <p:cNvPr id="4" name="Date Placeholder 3"/>
+          <p:cNvSpPr>
+            <a:spLocks noGrp="1"/>
+          </p:cNvSpPr>
+          <p:nvPr>
+            <p:ph type="dt" sz="half" idx="10"/>
           </p:nvPr>
         </p:nvSpPr>
         <p:spPr/>
@@ -5948,6 +6427,10 @@
           <a:bodyPr/>
           <a:lstStyle/>
           <a:p>
+            <a:r>
+              <a:rPr lang="en-US" dirty="0" smtClean="0"/>
+              <a:t>14. August 2015</a:t>
+            </a:r>
             <a:endParaRPr lang="en-US" dirty="0"/>
           </a:p>
         </p:txBody>
@@ -5973,105 +6456,83 @@
       </p:sp>
       <p:sp>
         <p:nvSpPr>
-          <p:cNvPr id="7" name="Picture Placeholder 6"/>
-          <p:cNvSpPr>
-            <a:spLocks noGrp="1"/>
-          </p:cNvSpPr>
-          <p:nvPr>
-            <p:ph type="pic" sz="quarter" idx="14"/>
+          <p:cNvPr id="7" name="Footer Placeholder 6"/>
+          <p:cNvSpPr>
+            <a:spLocks noGrp="1"/>
+          </p:cNvSpPr>
+          <p:nvPr>
+            <p:ph type="ftr" sz="quarter" idx="11"/>
           </p:nvPr>
         </p:nvSpPr>
         <p:spPr/>
-      </p:sp>
-      <p:sp>
-        <p:nvSpPr>
-          <p:cNvPr id="8" name="Picture Placeholder 7"/>
-          <p:cNvSpPr>
-            <a:spLocks noGrp="1"/>
-          </p:cNvSpPr>
-          <p:nvPr>
-            <p:ph type="pic" sz="quarter" idx="15"/>
+        <p:txBody>
+          <a:bodyPr/>
+          <a:lstStyle/>
+          <a:p>
+            <a:r>
+              <a:rPr lang="en-US" dirty="0" err="1" smtClean="0"/>
+              <a:t>Javascript</a:t>
+            </a:r>
+            <a:r>
+              <a:rPr lang="en-US" dirty="0" smtClean="0"/>
+              <a:t> Basics | </a:t>
+            </a:r>
+            <a:r>
+              <a:rPr lang="en-US" dirty="0" err="1" smtClean="0"/>
+              <a:t>nesp</a:t>
+            </a:r>
+            <a:r>
+              <a:rPr lang="en-US" dirty="0" smtClean="0"/>
+              <a:t>, </a:t>
+            </a:r>
+            <a:r>
+              <a:rPr lang="en-US" dirty="0" err="1" smtClean="0"/>
+              <a:t>stmi</a:t>
+            </a:r>
+            <a:r>
+              <a:rPr lang="en-US" dirty="0" smtClean="0"/>
+              <a:t>, </a:t>
+            </a:r>
+            <a:r>
+              <a:rPr lang="en-US" dirty="0" err="1" smtClean="0"/>
+              <a:t>mabo</a:t>
+            </a:r>
+            <a:endParaRPr lang="en-US" dirty="0"/>
+          </a:p>
+        </p:txBody>
+      </p:sp>
+      <p:sp>
+        <p:nvSpPr>
+          <p:cNvPr id="9" name="Slide Number Placeholder 8"/>
+          <p:cNvSpPr>
+            <a:spLocks noGrp="1"/>
+          </p:cNvSpPr>
+          <p:nvPr>
+            <p:ph type="sldNum" sz="quarter" idx="12"/>
           </p:nvPr>
         </p:nvSpPr>
         <p:spPr/>
-      </p:sp>
-      <p:sp>
-        <p:nvSpPr>
-          <p:cNvPr id="11" name="Footer Placeholder 10"/>
-          <p:cNvSpPr>
-            <a:spLocks noGrp="1"/>
-          </p:cNvSpPr>
-          <p:nvPr>
-            <p:ph type="ftr" sz="quarter" idx="11"/>
-          </p:nvPr>
-        </p:nvSpPr>
-        <p:spPr/>
         <p:txBody>
           <a:bodyPr/>
           <a:lstStyle/>
           <a:p>
             <a:r>
-              <a:rPr lang="de-CH" smtClean="0"/>
-              <a:t>Javascript Basics | nesp, stmi, mabo</a:t>
-            </a:r>
-            <a:endParaRPr lang="de-CH" dirty="0"/>
-          </a:p>
-        </p:txBody>
-      </p:sp>
-      <p:sp>
-        <p:nvSpPr>
-          <p:cNvPr id="12" name="Date Placeholder 11"/>
-          <p:cNvSpPr>
-            <a:spLocks noGrp="1"/>
-          </p:cNvSpPr>
-          <p:nvPr>
-            <p:ph type="dt" sz="half" idx="10"/>
-          </p:nvPr>
-        </p:nvSpPr>
-        <p:spPr/>
-        <p:txBody>
-          <a:bodyPr/>
-          <a:lstStyle/>
-          <a:p>
-            <a:r>
-              <a:rPr lang="de-CH" smtClean="0"/>
-              <a:t>14. August 2015</a:t>
-            </a:r>
-            <a:endParaRPr lang="de-CH" dirty="0"/>
-          </a:p>
-        </p:txBody>
-      </p:sp>
-      <p:sp>
-        <p:nvSpPr>
-          <p:cNvPr id="13" name="Slide Number Placeholder 12"/>
-          <p:cNvSpPr>
-            <a:spLocks noGrp="1"/>
-          </p:cNvSpPr>
-          <p:nvPr>
-            <p:ph type="sldNum" sz="quarter" idx="12"/>
-          </p:nvPr>
-        </p:nvSpPr>
-        <p:spPr/>
-        <p:txBody>
-          <a:bodyPr/>
-          <a:lstStyle/>
-          <a:p>
-            <a:r>
-              <a:rPr lang="de-CH" smtClean="0"/>
+              <a:rPr lang="en-GB" smtClean="0"/>
               <a:t>Slide </a:t>
             </a:r>
-            <a:fld id="{442A4CAA-BD91-44B4-B6AE-6417EEF2B0E2}" type="slidenum">
-              <a:rPr lang="de-CH" smtClean="0"/>
+            <a:fld id="{B945A87F-2CE4-4B6D-B6BF-F6BF6C5CB292}" type="slidenum">
+              <a:rPr smtClean="0"/>
+              <a:pPr/>
               <a:t>12</a:t>
             </a:fld>
-            <a:endParaRPr lang="de-CH" dirty="0"/>
+            <a:endParaRPr dirty="0"/>
           </a:p>
         </p:txBody>
       </p:sp>
     </p:spTree>
     <p:extLst>
       <p:ext uri="{BB962C8B-B14F-4D97-AF65-F5344CB8AC3E}">
-        <p14:creationId xmlns:p14="http://schemas.microsoft.com/office/powerpoint/2010/main" val="1889840885"/>
+        <p14:creationId xmlns:p14="http://schemas.microsoft.com/office/powerpoint/2010/main" val="2884851122"/>
       </p:ext>
     </p:extLst>
   </p:cSld>
@@ -6113,6 +6574,10 @@
           <a:bodyPr/>
           <a:lstStyle/>
           <a:p>
+            <a:r>
+              <a:rPr lang="en-US" dirty="0" smtClean="0"/>
+              <a:t>Exception handling</a:t>
+            </a:r>
             <a:endParaRPr lang="en-US" dirty="0"/>
           </a:p>
         </p:txBody>
@@ -6127,23 +6592,289 @@
             <p:ph idx="1"/>
           </p:nvPr>
         </p:nvSpPr>
+        <p:spPr>
+          <a:xfrm>
+            <a:off x="579438" y="933885"/>
+            <a:ext cx="8412161" cy="5632015"/>
+          </a:xfrm>
+        </p:spPr>
+        <p:txBody>
+          <a:bodyPr/>
+          <a:lstStyle/>
+          <a:p>
+            <a:pPr marL="342900" indent="-342900">
+              <a:spcBef>
+                <a:spcPts val="0"/>
+              </a:spcBef>
+              <a:buFont typeface="Arial" panose="020B0604020202020204" pitchFamily="34" charset="0"/>
+              <a:buChar char="•"/>
+            </a:pPr>
+            <a:r>
+              <a:rPr lang="en-US" dirty="0" smtClean="0"/>
+              <a:t>Throw short circuits the code and “bubbles up” through code until it reaches a catch.</a:t>
+            </a:r>
+          </a:p>
+          <a:p>
+            <a:pPr marL="342900" indent="-342900">
+              <a:spcBef>
+                <a:spcPts val="0"/>
+              </a:spcBef>
+              <a:buFont typeface="Arial" panose="020B0604020202020204" pitchFamily="34" charset="0"/>
+              <a:buChar char="•"/>
+            </a:pPr>
+            <a:endParaRPr lang="en-US" dirty="0" smtClean="0"/>
+          </a:p>
+          <a:p>
+            <a:pPr>
+              <a:spcBef>
+                <a:spcPts val="0"/>
+              </a:spcBef>
+            </a:pPr>
+            <a:endParaRPr lang="en-US" dirty="0" smtClean="0"/>
+          </a:p>
+          <a:p>
+            <a:pPr>
+              <a:spcBef>
+                <a:spcPts val="0"/>
+              </a:spcBef>
+            </a:pPr>
+            <a:r>
+              <a:rPr lang="en-US" dirty="0" smtClean="0"/>
+              <a:t>try </a:t>
+            </a:r>
+            <a:r>
+              <a:rPr lang="en-US" dirty="0"/>
+              <a:t>{</a:t>
+            </a:r>
+            <a:r>
+              <a:rPr lang="en-US" dirty="0"/>
+              <a:t/>
+            </a:r>
+            <a:br>
+              <a:rPr lang="en-US" dirty="0"/>
+            </a:br>
+            <a:r>
+              <a:rPr lang="en-US" dirty="0"/>
+              <a:t>    </a:t>
+            </a:r>
+            <a:r>
+              <a:rPr lang="en-US" dirty="0" smtClean="0"/>
+              <a:t>// </a:t>
+            </a:r>
+            <a:r>
+              <a:rPr lang="en-US" i="1" dirty="0" smtClean="0"/>
+              <a:t>Block </a:t>
+            </a:r>
+            <a:r>
+              <a:rPr lang="en-US" i="1" dirty="0"/>
+              <a:t>of code to </a:t>
+            </a:r>
+            <a:r>
+              <a:rPr lang="en-US" i="1" dirty="0" smtClean="0"/>
+              <a:t>try execute. Throws an error object.</a:t>
+            </a:r>
+          </a:p>
+          <a:p>
+            <a:pPr>
+              <a:spcBef>
+                <a:spcPts val="0"/>
+              </a:spcBef>
+            </a:pPr>
+            <a:r>
+              <a:rPr lang="en-US" dirty="0" smtClean="0"/>
+              <a:t>    throw </a:t>
+            </a:r>
+            <a:r>
+              <a:rPr lang="en-US" dirty="0"/>
+              <a:t>new Error(message, </a:t>
+            </a:r>
+            <a:r>
+              <a:rPr lang="en-US" dirty="0" err="1"/>
+              <a:t>fileName</a:t>
+            </a:r>
+            <a:r>
+              <a:rPr lang="en-US" dirty="0"/>
+              <a:t>, </a:t>
+            </a:r>
+            <a:r>
+              <a:rPr lang="en-US" dirty="0" err="1"/>
+              <a:t>lineNumber</a:t>
+            </a:r>
+            <a:r>
+              <a:rPr lang="en-US" dirty="0" smtClean="0"/>
+              <a:t>)</a:t>
+            </a:r>
+            <a:r>
+              <a:rPr lang="en-US" i="1" dirty="0"/>
+              <a:t/>
+            </a:r>
+            <a:br>
+              <a:rPr lang="en-US" i="1" dirty="0"/>
+            </a:br>
+            <a:r>
+              <a:rPr lang="en-US" dirty="0"/>
+              <a:t>}</a:t>
+            </a:r>
+            <a:r>
+              <a:rPr lang="en-US" dirty="0"/>
+              <a:t/>
+            </a:r>
+            <a:br>
+              <a:rPr lang="en-US" dirty="0"/>
+            </a:br>
+            <a:r>
+              <a:rPr lang="en-US" dirty="0"/>
+              <a:t>catch(err) {</a:t>
+            </a:r>
+            <a:r>
+              <a:rPr lang="en-US" dirty="0"/>
+              <a:t/>
+            </a:r>
+            <a:br>
+              <a:rPr lang="en-US" dirty="0"/>
+            </a:br>
+            <a:r>
+              <a:rPr lang="en-US" dirty="0"/>
+              <a:t>   </a:t>
+            </a:r>
+            <a:r>
+              <a:rPr lang="en-US" dirty="0" smtClean="0"/>
+              <a:t>// </a:t>
+            </a:r>
+            <a:r>
+              <a:rPr lang="en-US" i="1" dirty="0" smtClean="0"/>
+              <a:t>Block </a:t>
+            </a:r>
+            <a:r>
+              <a:rPr lang="en-US" i="1" dirty="0"/>
+              <a:t>of code to handle </a:t>
+            </a:r>
+            <a:r>
+              <a:rPr lang="en-US" i="1" dirty="0" smtClean="0"/>
+              <a:t>errors. Executes only if block in </a:t>
+            </a:r>
+            <a:r>
+              <a:rPr lang="en-US" b="1" i="1" dirty="0" smtClean="0"/>
+              <a:t>try</a:t>
+            </a:r>
+            <a:r>
+              <a:rPr lang="en-US" i="1" dirty="0" smtClean="0"/>
+              <a:t> </a:t>
+            </a:r>
+            <a:r>
+              <a:rPr lang="en-US" b="1" i="1" dirty="0" smtClean="0"/>
+              <a:t>throws</a:t>
+            </a:r>
+            <a:r>
+              <a:rPr lang="en-US" i="1" dirty="0" smtClean="0"/>
+              <a:t>.</a:t>
+            </a:r>
+            <a:r>
+              <a:rPr lang="en-US" i="1" dirty="0"/>
+              <a:t/>
+            </a:r>
+            <a:br>
+              <a:rPr lang="en-US" i="1" dirty="0"/>
+            </a:br>
+            <a:r>
+              <a:rPr lang="en-US" dirty="0" smtClean="0"/>
+              <a:t>}</a:t>
+            </a:r>
+          </a:p>
+          <a:p>
+            <a:pPr>
+              <a:spcBef>
+                <a:spcPts val="0"/>
+              </a:spcBef>
+            </a:pPr>
+            <a:r>
+              <a:rPr lang="en-US" dirty="0"/>
+              <a:t>finally {</a:t>
+            </a:r>
+          </a:p>
+          <a:p>
+            <a:pPr>
+              <a:spcBef>
+                <a:spcPts val="0"/>
+              </a:spcBef>
+            </a:pPr>
+            <a:r>
+              <a:rPr lang="en-US" i="1" dirty="0"/>
+              <a:t>    </a:t>
+            </a:r>
+            <a:r>
+              <a:rPr lang="en-US" i="1" dirty="0" smtClean="0"/>
+              <a:t>// Block </a:t>
+            </a:r>
+            <a:r>
+              <a:rPr lang="en-US" i="1" dirty="0"/>
+              <a:t>of code to be executed regardless of the </a:t>
+            </a:r>
+            <a:r>
+              <a:rPr lang="en-US" b="1" i="1" dirty="0" smtClean="0"/>
+              <a:t>try</a:t>
+            </a:r>
+            <a:r>
+              <a:rPr lang="en-US" i="1" dirty="0" smtClean="0"/>
+              <a:t>/</a:t>
+            </a:r>
+            <a:r>
+              <a:rPr lang="en-US" b="1" i="1" dirty="0" smtClean="0"/>
+              <a:t>catch</a:t>
+            </a:r>
+            <a:r>
+              <a:rPr lang="en-US" i="1" dirty="0" smtClean="0"/>
+              <a:t> </a:t>
+            </a:r>
+            <a:r>
+              <a:rPr lang="en-US" i="1" dirty="0"/>
+              <a:t>result</a:t>
+            </a:r>
+          </a:p>
+          <a:p>
+            <a:pPr>
+              <a:spcBef>
+                <a:spcPts val="0"/>
+              </a:spcBef>
+            </a:pPr>
+            <a:r>
+              <a:rPr lang="en-US" dirty="0" smtClean="0"/>
+              <a:t>}</a:t>
+            </a:r>
+          </a:p>
+        </p:txBody>
+      </p:sp>
+      <p:sp>
+        <p:nvSpPr>
+          <p:cNvPr id="4" name="Date Placeholder 3"/>
+          <p:cNvSpPr>
+            <a:spLocks noGrp="1"/>
+          </p:cNvSpPr>
+          <p:nvPr>
+            <p:ph type="dt" sz="half" idx="10"/>
+          </p:nvPr>
+        </p:nvSpPr>
         <p:spPr/>
         <p:txBody>
           <a:bodyPr/>
           <a:lstStyle/>
           <a:p>
+            <a:r>
+              <a:rPr lang="en-US" dirty="0" smtClean="0"/>
+              <a:t>14. August 2015</a:t>
+            </a:r>
             <a:endParaRPr lang="en-US" dirty="0"/>
           </a:p>
         </p:txBody>
       </p:sp>
       <p:sp>
         <p:nvSpPr>
-          <p:cNvPr id="6" name="Text Placeholder 5"/>
-          <p:cNvSpPr>
-            <a:spLocks noGrp="1"/>
-          </p:cNvSpPr>
-          <p:nvPr>
-            <p:ph type="body" sz="quarter" idx="13"/>
+          <p:cNvPr id="7" name="Footer Placeholder 6"/>
+          <p:cNvSpPr>
+            <a:spLocks noGrp="1"/>
+          </p:cNvSpPr>
+          <p:nvPr>
+            <p:ph type="ftr" sz="quarter" idx="11"/>
           </p:nvPr>
         </p:nvSpPr>
         <p:spPr/>
@@ -6151,99 +6882,70 @@
           <a:bodyPr/>
           <a:lstStyle/>
           <a:p>
+            <a:r>
+              <a:rPr lang="en-US" dirty="0" err="1" smtClean="0"/>
+              <a:t>Javascript</a:t>
+            </a:r>
+            <a:r>
+              <a:rPr lang="en-US" dirty="0" smtClean="0"/>
+              <a:t> Basics | </a:t>
+            </a:r>
+            <a:r>
+              <a:rPr lang="en-US" dirty="0" err="1" smtClean="0"/>
+              <a:t>nesp</a:t>
+            </a:r>
+            <a:r>
+              <a:rPr lang="en-US" dirty="0" smtClean="0"/>
+              <a:t>, </a:t>
+            </a:r>
+            <a:r>
+              <a:rPr lang="en-US" dirty="0" err="1" smtClean="0"/>
+              <a:t>stmi</a:t>
+            </a:r>
+            <a:r>
+              <a:rPr lang="en-US" dirty="0" smtClean="0"/>
+              <a:t>, </a:t>
+            </a:r>
+            <a:r>
+              <a:rPr lang="en-US" dirty="0" err="1" smtClean="0"/>
+              <a:t>mabo</a:t>
+            </a:r>
             <a:endParaRPr lang="en-US" dirty="0"/>
           </a:p>
         </p:txBody>
       </p:sp>
       <p:sp>
         <p:nvSpPr>
-          <p:cNvPr id="7" name="Picture Placeholder 6"/>
-          <p:cNvSpPr>
-            <a:spLocks noGrp="1"/>
-          </p:cNvSpPr>
-          <p:nvPr>
-            <p:ph type="pic" sz="quarter" idx="14"/>
+          <p:cNvPr id="9" name="Slide Number Placeholder 8"/>
+          <p:cNvSpPr>
+            <a:spLocks noGrp="1"/>
+          </p:cNvSpPr>
+          <p:nvPr>
+            <p:ph type="sldNum" sz="quarter" idx="12"/>
           </p:nvPr>
         </p:nvSpPr>
         <p:spPr/>
-      </p:sp>
-      <p:sp>
-        <p:nvSpPr>
-          <p:cNvPr id="10" name="Footer Placeholder 9"/>
-          <p:cNvSpPr>
-            <a:spLocks noGrp="1"/>
-          </p:cNvSpPr>
-          <p:nvPr>
-            <p:ph type="ftr" sz="quarter" idx="11"/>
-          </p:nvPr>
-        </p:nvSpPr>
-        <p:spPr/>
         <p:txBody>
           <a:bodyPr/>
           <a:lstStyle/>
           <a:p>
             <a:r>
-              <a:rPr lang="de-CH" smtClean="0"/>
-              <a:t>Javascript Basics | nesp, stmi, mabo</a:t>
-            </a:r>
-            <a:endParaRPr lang="de-CH" dirty="0"/>
-          </a:p>
-        </p:txBody>
-      </p:sp>
-      <p:sp>
-        <p:nvSpPr>
-          <p:cNvPr id="11" name="Date Placeholder 10"/>
-          <p:cNvSpPr>
-            <a:spLocks noGrp="1"/>
-          </p:cNvSpPr>
-          <p:nvPr>
-            <p:ph type="dt" sz="half" idx="10"/>
-          </p:nvPr>
-        </p:nvSpPr>
-        <p:spPr/>
-        <p:txBody>
-          <a:bodyPr/>
-          <a:lstStyle/>
-          <a:p>
-            <a:r>
-              <a:rPr lang="de-CH" smtClean="0"/>
-              <a:t>14. August 2015</a:t>
-            </a:r>
-            <a:endParaRPr lang="de-CH" dirty="0"/>
-          </a:p>
-        </p:txBody>
-      </p:sp>
-      <p:sp>
-        <p:nvSpPr>
-          <p:cNvPr id="12" name="Slide Number Placeholder 11"/>
-          <p:cNvSpPr>
-            <a:spLocks noGrp="1"/>
-          </p:cNvSpPr>
-          <p:nvPr>
-            <p:ph type="sldNum" sz="quarter" idx="12"/>
-          </p:nvPr>
-        </p:nvSpPr>
-        <p:spPr/>
-        <p:txBody>
-          <a:bodyPr/>
-          <a:lstStyle/>
-          <a:p>
-            <a:r>
-              <a:rPr lang="de-CH" smtClean="0"/>
+              <a:rPr lang="en-GB" smtClean="0"/>
               <a:t>Slide </a:t>
             </a:r>
-            <a:fld id="{72ACB5FB-31BB-4A6B-B507-45C1CAF85B0F}" type="slidenum">
-              <a:rPr lang="de-CH" smtClean="0"/>
+            <a:fld id="{B945A87F-2CE4-4B6D-B6BF-F6BF6C5CB292}" type="slidenum">
+              <a:rPr smtClean="0"/>
+              <a:pPr/>
               <a:t>13</a:t>
             </a:fld>
-            <a:endParaRPr lang="de-CH" dirty="0"/>
+            <a:endParaRPr dirty="0"/>
           </a:p>
         </p:txBody>
       </p:sp>
     </p:spTree>
     <p:extLst>
       <p:ext uri="{BB962C8B-B14F-4D97-AF65-F5344CB8AC3E}">
-        <p14:creationId xmlns:p14="http://schemas.microsoft.com/office/powerpoint/2010/main" val="2546209599"/>
+        <p14:creationId xmlns:p14="http://schemas.microsoft.com/office/powerpoint/2010/main" val="2884851122"/>
       </p:ext>
     </p:extLst>
   </p:cSld>
@@ -6277,7 +6979,7 @@
             <a:spLocks noGrp="1"/>
           </p:cNvSpPr>
           <p:nvPr>
-            <p:ph type="ctrTitle"/>
+            <p:ph type="title"/>
           </p:nvPr>
         </p:nvSpPr>
         <p:spPr/>
@@ -6285,21 +6987,217 @@
           <a:bodyPr/>
           <a:lstStyle/>
           <a:p>
+            <a:r>
+              <a:rPr lang="en-US" dirty="0" smtClean="0"/>
+              <a:t>Scopes of variables</a:t>
+            </a:r>
             <a:endParaRPr lang="en-US" dirty="0"/>
           </a:p>
         </p:txBody>
       </p:sp>
       <p:sp>
         <p:nvSpPr>
-          <p:cNvPr id="5" name="Picture Placeholder 4"/>
-          <p:cNvSpPr>
-            <a:spLocks noGrp="1"/>
-          </p:cNvSpPr>
-          <p:nvPr>
-            <p:ph type="pic" sz="quarter" idx="10"/>
+          <p:cNvPr id="3" name="Content Placeholder 2"/>
+          <p:cNvSpPr>
+            <a:spLocks noGrp="1"/>
+          </p:cNvSpPr>
+          <p:nvPr>
+            <p:ph idx="1"/>
+          </p:nvPr>
+        </p:nvSpPr>
+        <p:spPr>
+          <a:xfrm>
+            <a:off x="539552" y="1052736"/>
+            <a:ext cx="8412161" cy="4776787"/>
+          </a:xfrm>
+        </p:spPr>
+        <p:txBody>
+          <a:bodyPr/>
+          <a:lstStyle/>
+          <a:p>
+            <a:pPr marL="342900" indent="-342900">
+              <a:spcAft>
+                <a:spcPts val="1800"/>
+              </a:spcAft>
+              <a:buFont typeface="Arial" panose="020B0604020202020204" pitchFamily="34" charset="0"/>
+              <a:buChar char="•"/>
+            </a:pPr>
+            <a:r>
+              <a:rPr lang="en-US" dirty="0" smtClean="0"/>
+              <a:t>Global scope is reachable everywhere.</a:t>
+            </a:r>
+          </a:p>
+          <a:p>
+            <a:pPr>
+              <a:spcBef>
+                <a:spcPts val="0"/>
+              </a:spcBef>
+            </a:pPr>
+            <a:r>
+              <a:rPr lang="en-US" dirty="0" err="1"/>
+              <a:t>var</a:t>
+            </a:r>
+            <a:r>
+              <a:rPr lang="en-US" dirty="0"/>
+              <a:t> a = 1</a:t>
+            </a:r>
+            <a:r>
+              <a:rPr lang="en-US" dirty="0" smtClean="0"/>
+              <a:t>;</a:t>
+            </a:r>
+          </a:p>
+          <a:p>
+            <a:pPr>
+              <a:spcBef>
+                <a:spcPts val="0"/>
+              </a:spcBef>
+            </a:pPr>
+            <a:endParaRPr lang="en-US" dirty="0"/>
+          </a:p>
+          <a:p>
+            <a:pPr>
+              <a:spcBef>
+                <a:spcPts val="0"/>
+              </a:spcBef>
+            </a:pPr>
+            <a:r>
+              <a:rPr lang="en-US" dirty="0" smtClean="0"/>
+              <a:t>function </a:t>
+            </a:r>
+            <a:r>
+              <a:rPr lang="en-US" dirty="0"/>
+              <a:t>one() {</a:t>
+            </a:r>
+          </a:p>
+          <a:p>
+            <a:pPr>
+              <a:spcBef>
+                <a:spcPts val="0"/>
+              </a:spcBef>
+            </a:pPr>
+            <a:r>
+              <a:rPr lang="en-US" dirty="0" smtClean="0"/>
+              <a:t>     console.log(a);</a:t>
+            </a:r>
+          </a:p>
+          <a:p>
+            <a:pPr>
+              <a:spcBef>
+                <a:spcPts val="0"/>
+              </a:spcBef>
+            </a:pPr>
+            <a:r>
+              <a:rPr lang="en-US" dirty="0" smtClean="0"/>
+              <a:t>     a++;</a:t>
+            </a:r>
+            <a:endParaRPr lang="en-US" dirty="0"/>
+          </a:p>
+          <a:p>
+            <a:pPr>
+              <a:spcBef>
+                <a:spcPts val="0"/>
+              </a:spcBef>
+            </a:pPr>
+            <a:r>
+              <a:rPr lang="en-US" dirty="0" smtClean="0"/>
+              <a:t>}</a:t>
+            </a:r>
+          </a:p>
+          <a:p>
+            <a:pPr>
+              <a:spcBef>
+                <a:spcPts val="0"/>
+              </a:spcBef>
+            </a:pPr>
+            <a:endParaRPr lang="en-US" dirty="0"/>
+          </a:p>
+          <a:p>
+            <a:pPr>
+              <a:spcBef>
+                <a:spcPts val="0"/>
+              </a:spcBef>
+            </a:pPr>
+            <a:r>
+              <a:rPr lang="en-US" dirty="0" smtClean="0"/>
+              <a:t>Function two() {</a:t>
+            </a:r>
+          </a:p>
+          <a:p>
+            <a:pPr>
+              <a:spcBef>
+                <a:spcPts val="0"/>
+              </a:spcBef>
+            </a:pPr>
+            <a:r>
+              <a:rPr lang="en-US" dirty="0" smtClean="0"/>
+              <a:t>    console.log(a);</a:t>
+            </a:r>
+          </a:p>
+          <a:p>
+            <a:pPr>
+              <a:spcBef>
+                <a:spcPts val="0"/>
+              </a:spcBef>
+            </a:pPr>
+            <a:r>
+              <a:rPr lang="en-US" dirty="0" smtClean="0"/>
+              <a:t>}</a:t>
+            </a:r>
+          </a:p>
+          <a:p>
+            <a:pPr>
+              <a:spcBef>
+                <a:spcPts val="0"/>
+              </a:spcBef>
+            </a:pPr>
+            <a:endParaRPr lang="en-US" dirty="0"/>
+          </a:p>
+          <a:p>
+            <a:pPr>
+              <a:spcBef>
+                <a:spcPts val="0"/>
+              </a:spcBef>
+            </a:pPr>
+            <a:r>
+              <a:rPr lang="en-US" dirty="0" smtClean="0"/>
+              <a:t>one(); // outputs 1</a:t>
+            </a:r>
+          </a:p>
+          <a:p>
+            <a:pPr>
+              <a:spcBef>
+                <a:spcPts val="0"/>
+              </a:spcBef>
+            </a:pPr>
+            <a:r>
+              <a:rPr lang="en-US" dirty="0" smtClean="0"/>
+              <a:t>two(); // outputs 2</a:t>
+            </a:r>
+          </a:p>
+        </p:txBody>
+      </p:sp>
+      <p:sp>
+        <p:nvSpPr>
+          <p:cNvPr id="4" name="Date Placeholder 3"/>
+          <p:cNvSpPr>
+            <a:spLocks noGrp="1"/>
+          </p:cNvSpPr>
+          <p:nvPr>
+            <p:ph type="dt" sz="half" idx="10"/>
           </p:nvPr>
         </p:nvSpPr>
         <p:spPr/>
+        <p:txBody>
+          <a:bodyPr/>
+          <a:lstStyle/>
+          <a:p>
+            <a:r>
+              <a:rPr lang="en-US" dirty="0" smtClean="0"/>
+              <a:t>14. August 2015</a:t>
+            </a:r>
+            <a:endParaRPr lang="en-US" dirty="0"/>
+          </a:p>
+        </p:txBody>
       </p:sp>
       <p:sp>
         <p:nvSpPr>
@@ -6308,7 +7206,7 @@
             <a:spLocks noGrp="1"/>
           </p:cNvSpPr>
           <p:nvPr>
-            <p:ph type="ftr" sz="quarter" idx="3"/>
+            <p:ph type="ftr" sz="quarter" idx="11"/>
           </p:nvPr>
         </p:nvSpPr>
         <p:spPr/>
@@ -6317,44 +7215,45 @@
           <a:lstStyle/>
           <a:p>
             <a:r>
-              <a:rPr lang="de-CH" smtClean="0"/>
-              <a:t>Javascript Basics | nesp, stmi, mabo</a:t>
-            </a:r>
-            <a:endParaRPr lang="de-CH" dirty="0"/>
-          </a:p>
-        </p:txBody>
-      </p:sp>
-      <p:sp>
-        <p:nvSpPr>
-          <p:cNvPr id="8" name="Date Placeholder 7"/>
-          <p:cNvSpPr>
-            <a:spLocks noGrp="1"/>
-          </p:cNvSpPr>
-          <p:nvPr>
-            <p:ph type="dt" sz="half" idx="2"/>
-          </p:nvPr>
-        </p:nvSpPr>
-        <p:spPr/>
-        <p:txBody>
-          <a:bodyPr/>
-          <a:lstStyle/>
-          <a:p>
-            <a:r>
-              <a:rPr lang="de-CH" smtClean="0"/>
-              <a:t>14. August 2015</a:t>
-            </a:r>
-            <a:endParaRPr lang="de-CH" dirty="0"/>
-          </a:p>
-        </p:txBody>
-      </p:sp>
-      <p:sp>
-        <p:nvSpPr>
-          <p:cNvPr id="10" name="Slide Number Placeholder 9"/>
-          <p:cNvSpPr>
-            <a:spLocks noGrp="1"/>
-          </p:cNvSpPr>
-          <p:nvPr>
-            <p:ph type="sldNum" sz="quarter" idx="4"/>
+              <a:rPr lang="en-US" dirty="0" err="1" smtClean="0"/>
+              <a:t>Javascript</a:t>
+            </a:r>
+            <a:r>
+              <a:rPr lang="en-US" dirty="0" smtClean="0"/>
+              <a:t> Basics | </a:t>
+            </a:r>
+            <a:r>
+              <a:rPr lang="en-US" dirty="0" err="1" smtClean="0"/>
+              <a:t>nesp</a:t>
+            </a:r>
+            <a:r>
+              <a:rPr lang="en-US" dirty="0" smtClean="0"/>
+              <a:t>, </a:t>
+            </a:r>
+            <a:r>
+              <a:rPr lang="en-US" dirty="0" err="1" smtClean="0"/>
+              <a:t>stmi</a:t>
+            </a:r>
+            <a:r>
+              <a:rPr lang="en-US" dirty="0" smtClean="0"/>
+              <a:t>, </a:t>
+            </a:r>
+            <a:r>
+              <a:rPr lang="en-US" dirty="0" err="1" smtClean="0"/>
+              <a:t>mabo</a:t>
+            </a:r>
+            <a:endParaRPr lang="en-US" dirty="0"/>
+          </a:p>
+        </p:txBody>
+      </p:sp>
+      <p:sp>
+        <p:nvSpPr>
+          <p:cNvPr id="9" name="Slide Number Placeholder 8"/>
+          <p:cNvSpPr>
+            <a:spLocks noGrp="1"/>
+          </p:cNvSpPr>
+          <p:nvPr>
+            <p:ph type="sldNum" sz="quarter" idx="12"/>
           </p:nvPr>
         </p:nvSpPr>
         <p:spPr/>
@@ -6366,7 +7265,7 @@
               <a:rPr lang="en-GB" smtClean="0"/>
               <a:t>Slide </a:t>
             </a:r>
-            <a:fld id="{194A03B6-8724-4C6B-85DC-8A3C67F14C54}" type="slidenum">
+            <a:fld id="{B945A87F-2CE4-4B6D-B6BF-F6BF6C5CB292}" type="slidenum">
               <a:rPr smtClean="0"/>
               <a:pPr/>
               <a:t>14</a:t>
@@ -6378,7 +7277,334 @@
     </p:spTree>
     <p:extLst>
       <p:ext uri="{BB962C8B-B14F-4D97-AF65-F5344CB8AC3E}">
-        <p14:creationId xmlns:p14="http://schemas.microsoft.com/office/powerpoint/2010/main" val="3279471758"/>
+        <p14:creationId xmlns:p14="http://schemas.microsoft.com/office/powerpoint/2010/main" val="2884851122"/>
+      </p:ext>
+    </p:extLst>
+  </p:cSld>
+  <p:clrMapOvr>
+    <a:masterClrMapping/>
+  </p:clrMapOvr>
+</p:sld>
+</file>
+
+<file path=ppt/slides/slide15.xml><?xml version="1.0" encoding="utf-8"?>
+<p:sld xmlns:a="http://schemas.openxmlformats.org/drawingml/2006/main" xmlns:r="http://schemas.openxmlformats.org/officeDocument/2006/relationships" xmlns:p="http://schemas.openxmlformats.org/presentationml/2006/main">
+  <p:cSld>
+    <p:spTree>
+      <p:nvGrpSpPr>
+        <p:cNvPr id="1" name=""/>
+        <p:cNvGrpSpPr/>
+        <p:nvPr/>
+      </p:nvGrpSpPr>
+      <p:grpSpPr>
+        <a:xfrm>
+          <a:off x="0" y="0"/>
+          <a:ext cx="0" cy="0"/>
+          <a:chOff x="0" y="0"/>
+          <a:chExt cx="0" cy="0"/>
+        </a:xfrm>
+      </p:grpSpPr>
+      <p:sp>
+        <p:nvSpPr>
+          <p:cNvPr id="2" name="Title 1"/>
+          <p:cNvSpPr>
+            <a:spLocks noGrp="1"/>
+          </p:cNvSpPr>
+          <p:nvPr>
+            <p:ph type="title"/>
+          </p:nvPr>
+        </p:nvSpPr>
+        <p:spPr/>
+        <p:txBody>
+          <a:bodyPr/>
+          <a:lstStyle/>
+          <a:p>
+            <a:r>
+              <a:rPr lang="en-US" dirty="0"/>
+              <a:t>Scopes of variables</a:t>
+            </a:r>
+          </a:p>
+        </p:txBody>
+      </p:sp>
+      <p:sp>
+        <p:nvSpPr>
+          <p:cNvPr id="3" name="Content Placeholder 2"/>
+          <p:cNvSpPr>
+            <a:spLocks noGrp="1"/>
+          </p:cNvSpPr>
+          <p:nvPr>
+            <p:ph idx="1"/>
+          </p:nvPr>
+        </p:nvSpPr>
+        <p:spPr/>
+        <p:txBody>
+          <a:bodyPr/>
+          <a:lstStyle/>
+          <a:p>
+            <a:pPr marL="342900" indent="-342900">
+              <a:spcAft>
+                <a:spcPts val="1800"/>
+              </a:spcAft>
+              <a:buFont typeface="Arial" panose="020B0604020202020204" pitchFamily="34" charset="0"/>
+              <a:buChar char="•"/>
+            </a:pPr>
+            <a:r>
+              <a:rPr lang="en-US" dirty="0" smtClean="0"/>
+              <a:t>Local is </a:t>
+            </a:r>
+            <a:r>
+              <a:rPr lang="en-US" dirty="0"/>
+              <a:t>reachable</a:t>
+            </a:r>
+            <a:r>
+              <a:rPr lang="en-US" dirty="0" smtClean="0"/>
+              <a:t> (only </a:t>
+            </a:r>
+            <a:r>
+              <a:rPr lang="en-US" dirty="0"/>
+              <a:t>in a function</a:t>
+            </a:r>
+            <a:r>
+              <a:rPr lang="en-US" dirty="0" smtClean="0"/>
+              <a:t>):</a:t>
+            </a:r>
+          </a:p>
+          <a:p>
+            <a:pPr marL="342900" indent="-342900">
+              <a:spcAft>
+                <a:spcPts val="1800"/>
+              </a:spcAft>
+              <a:buFont typeface="Arial" panose="020B0604020202020204" pitchFamily="34" charset="0"/>
+              <a:buChar char="•"/>
+            </a:pPr>
+            <a:r>
+              <a:rPr lang="en-US" dirty="0" smtClean="0"/>
+              <a:t>Hides a global variable if it has the same name.</a:t>
+            </a:r>
+          </a:p>
+          <a:p>
+            <a:pPr>
+              <a:spcBef>
+                <a:spcPts val="0"/>
+              </a:spcBef>
+            </a:pPr>
+            <a:r>
+              <a:rPr lang="en-US" dirty="0" smtClean="0"/>
+              <a:t>function </a:t>
+            </a:r>
+            <a:r>
+              <a:rPr lang="en-US" dirty="0"/>
+              <a:t>three() {</a:t>
+            </a:r>
+          </a:p>
+          <a:p>
+            <a:pPr>
+              <a:spcBef>
+                <a:spcPts val="0"/>
+              </a:spcBef>
+            </a:pPr>
+            <a:r>
+              <a:rPr lang="en-US" dirty="0"/>
+              <a:t>  </a:t>
+            </a:r>
+            <a:r>
+              <a:rPr lang="en-US" dirty="0" err="1"/>
+              <a:t>var</a:t>
+            </a:r>
+            <a:r>
+              <a:rPr lang="en-US" dirty="0"/>
+              <a:t> a = 3;</a:t>
+            </a:r>
+          </a:p>
+          <a:p>
+            <a:pPr>
+              <a:spcBef>
+                <a:spcPts val="0"/>
+              </a:spcBef>
+            </a:pPr>
+            <a:r>
+              <a:rPr lang="en-US" dirty="0"/>
+              <a:t>  alert(a</a:t>
+            </a:r>
+            <a:r>
+              <a:rPr lang="en-US" dirty="0" smtClean="0"/>
+              <a:t>); // outputs 3 always</a:t>
+            </a:r>
+            <a:endParaRPr lang="en-US" dirty="0"/>
+          </a:p>
+          <a:p>
+            <a:pPr>
+              <a:spcBef>
+                <a:spcPts val="0"/>
+              </a:spcBef>
+            </a:pPr>
+            <a:r>
+              <a:rPr lang="en-US" dirty="0"/>
+              <a:t>}</a:t>
+            </a:r>
+          </a:p>
+          <a:p>
+            <a:pPr>
+              <a:spcBef>
+                <a:spcPts val="0"/>
+              </a:spcBef>
+            </a:pPr>
+            <a:endParaRPr lang="en-US" dirty="0" smtClean="0"/>
+          </a:p>
+          <a:p>
+            <a:pPr>
+              <a:spcBef>
+                <a:spcPts val="0"/>
+              </a:spcBef>
+            </a:pPr>
+            <a:endParaRPr lang="en-US" dirty="0"/>
+          </a:p>
+          <a:p>
+            <a:pPr marL="342900" indent="-342900">
+              <a:spcBef>
+                <a:spcPts val="0"/>
+              </a:spcBef>
+              <a:buFont typeface="Arial" panose="020B0604020202020204" pitchFamily="34" charset="0"/>
+              <a:buChar char="•"/>
+            </a:pPr>
+            <a:r>
+              <a:rPr lang="en-US" dirty="0"/>
+              <a:t>Careful: No new scope for blocks of </a:t>
+            </a:r>
+            <a:r>
+              <a:rPr lang="en-US" b="1" dirty="0"/>
+              <a:t>if</a:t>
+            </a:r>
+            <a:r>
+              <a:rPr lang="en-US" dirty="0"/>
+              <a:t>,</a:t>
+            </a:r>
+            <a:r>
+              <a:rPr lang="en-US" b="1" dirty="0"/>
+              <a:t> for</a:t>
+            </a:r>
+            <a:r>
+              <a:rPr lang="en-US" dirty="0"/>
+              <a:t>,</a:t>
+            </a:r>
+            <a:r>
+              <a:rPr lang="en-US" b="1" dirty="0"/>
+              <a:t> </a:t>
+            </a:r>
+            <a:r>
+              <a:rPr lang="en-US" b="1" dirty="0" smtClean="0"/>
+              <a:t>while…</a:t>
+            </a:r>
+          </a:p>
+          <a:p>
+            <a:pPr marL="342900" indent="-342900">
+              <a:spcBef>
+                <a:spcPts val="0"/>
+              </a:spcBef>
+              <a:buFont typeface="Arial" panose="020B0604020202020204" pitchFamily="34" charset="0"/>
+              <a:buChar char="•"/>
+            </a:pPr>
+            <a:endParaRPr lang="en-US" b="1" dirty="0" smtClean="0"/>
+          </a:p>
+        </p:txBody>
+      </p:sp>
+      <p:sp>
+        <p:nvSpPr>
+          <p:cNvPr id="4" name="Date Placeholder 3"/>
+          <p:cNvSpPr>
+            <a:spLocks noGrp="1"/>
+          </p:cNvSpPr>
+          <p:nvPr>
+            <p:ph type="dt" sz="half" idx="10"/>
+          </p:nvPr>
+        </p:nvSpPr>
+        <p:spPr/>
+        <p:txBody>
+          <a:bodyPr/>
+          <a:lstStyle/>
+          <a:p>
+            <a:r>
+              <a:rPr lang="de-CH" smtClean="0"/>
+              <a:t>14. August 2015</a:t>
+            </a:r>
+            <a:endParaRPr lang="de-CH" dirty="0"/>
+          </a:p>
+        </p:txBody>
+      </p:sp>
+      <p:sp>
+        <p:nvSpPr>
+          <p:cNvPr id="5" name="Footer Placeholder 4"/>
+          <p:cNvSpPr>
+            <a:spLocks noGrp="1"/>
+          </p:cNvSpPr>
+          <p:nvPr>
+            <p:ph type="ftr" sz="quarter" idx="11"/>
+          </p:nvPr>
+        </p:nvSpPr>
+        <p:spPr/>
+        <p:txBody>
+          <a:bodyPr/>
+          <a:lstStyle/>
+          <a:p>
+            <a:r>
+              <a:rPr lang="de-CH" smtClean="0"/>
+              <a:t>Javascript Basics | nesp, stmi, mabo</a:t>
+            </a:r>
+            <a:endParaRPr lang="de-CH" dirty="0"/>
+          </a:p>
+        </p:txBody>
+      </p:sp>
+      <p:sp>
+        <p:nvSpPr>
+          <p:cNvPr id="7" name="Text Placeholder 6"/>
+          <p:cNvSpPr>
+            <a:spLocks noGrp="1"/>
+          </p:cNvSpPr>
+          <p:nvPr>
+            <p:ph type="body" sz="quarter" idx="13"/>
+          </p:nvPr>
+        </p:nvSpPr>
+        <p:spPr/>
+        <p:txBody>
+          <a:bodyPr/>
+          <a:lstStyle/>
+          <a:p>
+            <a:endParaRPr lang="en-US"/>
+          </a:p>
+        </p:txBody>
+      </p:sp>
+      <p:sp>
+        <p:nvSpPr>
+          <p:cNvPr id="8" name="Slide Number Placeholder 7"/>
+          <p:cNvSpPr>
+            <a:spLocks noGrp="1"/>
+          </p:cNvSpPr>
+          <p:nvPr>
+            <p:ph type="sldNum" sz="quarter" idx="12"/>
+          </p:nvPr>
+        </p:nvSpPr>
+        <p:spPr/>
+        <p:txBody>
+          <a:bodyPr/>
+          <a:lstStyle/>
+          <a:p>
+            <a:r>
+              <a:rPr lang="en-GB" smtClean="0"/>
+              <a:t>Slide </a:t>
+            </a:r>
+            <a:fld id="{B945A87F-2CE4-4B6D-B6BF-F6BF6C5CB292}" type="slidenum">
+              <a:rPr smtClean="0"/>
+              <a:pPr/>
+              <a:t>15</a:t>
+            </a:fld>
+            <a:endParaRPr dirty="0"/>
+          </a:p>
+        </p:txBody>
+      </p:sp>
+    </p:spTree>
+    <p:extLst>
+      <p:ext uri="{BB962C8B-B14F-4D97-AF65-F5344CB8AC3E}">
+        <p14:creationId xmlns:p14="http://schemas.microsoft.com/office/powerpoint/2010/main" val="3322228320"/>
       </p:ext>
     </p:extLst>
   </p:cSld>
@@ -6420,18 +7646,30 @@
           <a:bodyPr/>
           <a:lstStyle/>
           <a:p>
+            <a:r>
+              <a:rPr lang="en-US" dirty="0" smtClean="0"/>
+              <a:t>What is JavaScript (</a:t>
+            </a:r>
+            <a:r>
+              <a:rPr lang="en-US" dirty="0" err="1" smtClean="0"/>
+              <a:t>EcmaScript</a:t>
+            </a:r>
+            <a:r>
+              <a:rPr lang="en-US" dirty="0" smtClean="0"/>
+              <a:t>)?</a:t>
+            </a:r>
             <a:endParaRPr lang="en-US" dirty="0"/>
           </a:p>
         </p:txBody>
       </p:sp>
       <p:sp>
         <p:nvSpPr>
-          <p:cNvPr id="3" name="Text Placeholder 2"/>
-          <p:cNvSpPr>
-            <a:spLocks noGrp="1"/>
-          </p:cNvSpPr>
-          <p:nvPr>
-            <p:ph type="body" idx="1"/>
+          <p:cNvPr id="3" name="Content Placeholder 2"/>
+          <p:cNvSpPr>
+            <a:spLocks noGrp="1"/>
+          </p:cNvSpPr>
+          <p:nvPr>
+            <p:ph idx="1"/>
           </p:nvPr>
         </p:nvSpPr>
         <p:spPr/>
@@ -6439,54 +7677,163 @@
           <a:bodyPr/>
           <a:lstStyle/>
           <a:p>
+            <a:pPr marL="342900" indent="-342900">
+              <a:buFont typeface="Arial" panose="020B0604020202020204" pitchFamily="34" charset="0"/>
+              <a:buChar char="•"/>
+            </a:pPr>
+            <a:r>
+              <a:rPr lang="en-US" dirty="0" smtClean="0"/>
+              <a:t>Characteristics:</a:t>
+            </a:r>
+          </a:p>
+          <a:p>
+            <a:pPr marL="608013" lvl="1" indent="-342900">
+              <a:buFont typeface="Arial" panose="020B0604020202020204" pitchFamily="34" charset="0"/>
+              <a:buChar char="•"/>
+            </a:pPr>
+            <a:r>
+              <a:rPr lang="en-US" dirty="0" smtClean="0"/>
+              <a:t>Dynamic (types of variables can be changed)</a:t>
+            </a:r>
+          </a:p>
+          <a:p>
+            <a:pPr marL="608013" lvl="1" indent="-342900">
+              <a:buFont typeface="Arial" panose="020B0604020202020204" pitchFamily="34" charset="0"/>
+              <a:buChar char="•"/>
+            </a:pPr>
+            <a:r>
+              <a:rPr lang="en-US" dirty="0" smtClean="0"/>
+              <a:t>Imperative</a:t>
+            </a:r>
+          </a:p>
+          <a:p>
+            <a:pPr marL="608013" lvl="1" indent="-342900">
+              <a:buFont typeface="Arial" panose="020B0604020202020204" pitchFamily="34" charset="0"/>
+              <a:buChar char="•"/>
+            </a:pPr>
+            <a:r>
+              <a:rPr lang="en-US" dirty="0" smtClean="0"/>
+              <a:t>Object-oriented (prototype based)</a:t>
+            </a:r>
+          </a:p>
+          <a:p>
+            <a:pPr marL="881063" lvl="2" indent="-342900">
+              <a:buFont typeface="Arial" panose="020B0604020202020204" pitchFamily="34" charset="0"/>
+              <a:buChar char="•"/>
+            </a:pPr>
+            <a:r>
+              <a:rPr lang="en-US" dirty="0" smtClean="0"/>
+              <a:t>Objects created by cloning existing objects and extending them</a:t>
+            </a:r>
+          </a:p>
+          <a:p>
+            <a:pPr marL="608013" lvl="1" indent="-342900">
+              <a:buFont typeface="Arial" panose="020B0604020202020204" pitchFamily="34" charset="0"/>
+              <a:buChar char="•"/>
+            </a:pPr>
+            <a:r>
+              <a:rPr lang="en-US" dirty="0"/>
+              <a:t>Functional</a:t>
+            </a:r>
+          </a:p>
+          <a:p>
+            <a:pPr marL="881063" lvl="2" indent="-342900">
+              <a:buFont typeface="Arial" panose="020B0604020202020204" pitchFamily="34" charset="0"/>
+              <a:buChar char="•"/>
+            </a:pPr>
+            <a:r>
+              <a:rPr lang="en-US" dirty="0"/>
+              <a:t>Everything is a function (even objects)</a:t>
+            </a:r>
+          </a:p>
+          <a:p>
+            <a:pPr marL="881063" lvl="2" indent="-342900">
+              <a:buFont typeface="Arial" panose="020B0604020202020204" pitchFamily="34" charset="0"/>
+              <a:buChar char="•"/>
+            </a:pPr>
+            <a:r>
+              <a:rPr lang="en-US" dirty="0"/>
+              <a:t>Function is a </a:t>
+            </a:r>
+            <a:r>
+              <a:rPr lang="en-US" dirty="0" smtClean="0"/>
+              <a:t>“base type” </a:t>
+            </a:r>
+            <a:r>
+              <a:rPr lang="en-US" dirty="0"/>
+              <a:t>(like </a:t>
+            </a:r>
+            <a:r>
+              <a:rPr lang="en-US" b="1" dirty="0"/>
+              <a:t>object</a:t>
+            </a:r>
+            <a:r>
+              <a:rPr lang="en-US" dirty="0"/>
+              <a:t> in C# &amp; JAVA</a:t>
+            </a:r>
+            <a:r>
+              <a:rPr lang="en-US" dirty="0" smtClean="0"/>
+              <a:t>)</a:t>
+            </a:r>
+          </a:p>
+          <a:p>
+            <a:pPr marL="881063" lvl="2" indent="-342900">
+              <a:buFont typeface="Arial" panose="020B0604020202020204" pitchFamily="34" charset="0"/>
+              <a:buChar char="•"/>
+            </a:pPr>
             <a:endParaRPr lang="en-US" dirty="0"/>
           </a:p>
-        </p:txBody>
-      </p:sp>
-      <p:sp>
-        <p:nvSpPr>
-          <p:cNvPr id="6" name="Picture Placeholder 5"/>
-          <p:cNvSpPr>
-            <a:spLocks noGrp="1"/>
-          </p:cNvSpPr>
-          <p:nvPr>
-            <p:ph type="pic" sz="quarter" idx="10"/>
+          <a:p>
+            <a:pPr marL="608013" lvl="1" indent="-342900">
+              <a:buFont typeface="Arial" panose="020B0604020202020204" pitchFamily="34" charset="0"/>
+              <a:buChar char="•"/>
+            </a:pPr>
+            <a:r>
+              <a:rPr lang="en-US" dirty="0" smtClean="0"/>
+              <a:t>Run in web browser script engine</a:t>
+            </a:r>
+            <a:endParaRPr lang="en-US" dirty="0"/>
+          </a:p>
+        </p:txBody>
+      </p:sp>
+      <p:sp>
+        <p:nvSpPr>
+          <p:cNvPr id="6" name="Text Placeholder 5"/>
+          <p:cNvSpPr>
+            <a:spLocks noGrp="1"/>
+          </p:cNvSpPr>
+          <p:nvPr>
+            <p:ph type="body" sz="quarter" idx="13"/>
           </p:nvPr>
         </p:nvSpPr>
         <p:spPr/>
-      </p:sp>
-      <p:sp>
-        <p:nvSpPr>
-          <p:cNvPr id="7" name="Picture Placeholder 6"/>
-          <p:cNvSpPr>
-            <a:spLocks noGrp="1"/>
-          </p:cNvSpPr>
-          <p:nvPr>
-            <p:ph type="pic" sz="quarter" idx="11"/>
-          </p:nvPr>
-        </p:nvSpPr>
-        <p:spPr/>
-      </p:sp>
-      <p:sp>
-        <p:nvSpPr>
-          <p:cNvPr id="8" name="Picture Placeholder 7"/>
-          <p:cNvSpPr>
-            <a:spLocks noGrp="1"/>
-          </p:cNvSpPr>
-          <p:nvPr>
-            <p:ph type="pic" sz="quarter" idx="12"/>
-          </p:nvPr>
-        </p:nvSpPr>
-        <p:spPr/>
-      </p:sp>
-      <p:sp>
-        <p:nvSpPr>
-          <p:cNvPr id="11" name="Footer Placeholder 10"/>
-          <p:cNvSpPr>
-            <a:spLocks noGrp="1"/>
-          </p:cNvSpPr>
-          <p:nvPr>
-            <p:ph type="ftr" sz="quarter" idx="3"/>
+        <p:txBody>
+          <a:bodyPr/>
+          <a:lstStyle/>
+          <a:p>
+            <a:r>
+              <a:rPr lang="en-US" dirty="0"/>
+              <a:t>JavaScript is the </a:t>
+            </a:r>
+            <a:r>
+              <a:rPr lang="en-US" dirty="0" smtClean="0"/>
+              <a:t>programming (script) </a:t>
+            </a:r>
+            <a:r>
+              <a:rPr lang="en-US" dirty="0"/>
+              <a:t>language of HTML and the Web.</a:t>
+            </a:r>
+          </a:p>
+        </p:txBody>
+      </p:sp>
+      <p:sp>
+        <p:nvSpPr>
+          <p:cNvPr id="9" name="Footer Placeholder 8"/>
+          <p:cNvSpPr>
+            <a:spLocks noGrp="1"/>
+          </p:cNvSpPr>
+          <p:nvPr>
+            <p:ph type="ftr" sz="quarter" idx="11"/>
           </p:nvPr>
         </p:nvSpPr>
         <p:spPr/>
@@ -6504,12 +7851,12 @@
       </p:sp>
       <p:sp>
         <p:nvSpPr>
-          <p:cNvPr id="12" name="Date Placeholder 11"/>
-          <p:cNvSpPr>
-            <a:spLocks noGrp="1"/>
-          </p:cNvSpPr>
-          <p:nvPr>
-            <p:ph type="dt" sz="half" idx="2"/>
+          <p:cNvPr id="10" name="Date Placeholder 9"/>
+          <p:cNvSpPr>
+            <a:spLocks noGrp="1"/>
+          </p:cNvSpPr>
+          <p:nvPr>
+            <p:ph type="dt" sz="half" idx="10"/>
           </p:nvPr>
         </p:nvSpPr>
         <p:spPr/>
@@ -6527,12 +7874,12 @@
       </p:sp>
       <p:sp>
         <p:nvSpPr>
-          <p:cNvPr id="13" name="Slide Number Placeholder 12"/>
-          <p:cNvSpPr>
-            <a:spLocks noGrp="1"/>
-          </p:cNvSpPr>
-          <p:nvPr>
-            <p:ph type="sldNum" sz="quarter" idx="4"/>
+          <p:cNvPr id="11" name="Slide Number Placeholder 10"/>
+          <p:cNvSpPr>
+            <a:spLocks noGrp="1"/>
+          </p:cNvSpPr>
+          <p:nvPr>
+            <p:ph type="sldNum" sz="quarter" idx="12"/>
           </p:nvPr>
         </p:nvSpPr>
         <p:spPr/>
@@ -6544,7 +7891,7 @@
               <a:rPr lang="de-CH" smtClean="0"/>
               <a:t>Slide </a:t>
             </a:r>
-            <a:fld id="{D7FD8659-BE5B-432F-9F87-46366268B90E}" type="slidenum">
+            <a:fld id="{82695712-81D7-44C7-8097-285E2E69108D}" type="slidenum">
               <a:rPr lang="de-CH" smtClean="0"/>
               <a:t>2</a:t>
             </a:fld>
@@ -6555,7 +7902,7 @@
     </p:spTree>
     <p:extLst>
       <p:ext uri="{BB962C8B-B14F-4D97-AF65-F5344CB8AC3E}">
-        <p14:creationId xmlns:p14="http://schemas.microsoft.com/office/powerpoint/2010/main" val="3454182098"/>
+        <p14:creationId xmlns:p14="http://schemas.microsoft.com/office/powerpoint/2010/main" val="2884851122"/>
       </p:ext>
     </p:extLst>
   </p:cSld>
@@ -6599,15 +7946,7 @@
           <a:p>
             <a:r>
               <a:rPr lang="en-US" dirty="0" smtClean="0"/>
-              <a:t>What is JavaScript (</a:t>
-            </a:r>
-            <a:r>
-              <a:rPr lang="en-US" dirty="0" err="1" smtClean="0"/>
-              <a:t>EcmaScript</a:t>
-            </a:r>
-            <a:r>
-              <a:rPr lang="en-US" dirty="0" smtClean="0"/>
-              <a:t>)?</a:t>
+              <a:t>Data types</a:t>
             </a:r>
             <a:endParaRPr lang="en-US" dirty="0"/>
           </a:p>
@@ -6634,7 +7973,7 @@
             </a:pPr>
             <a:r>
               <a:rPr lang="en-US" dirty="0" smtClean="0"/>
-              <a:t>Characteristics:</a:t>
+              <a:t>Primitives:</a:t>
             </a:r>
           </a:p>
           <a:p>
@@ -6644,7 +7983,7 @@
             </a:pPr>
             <a:r>
               <a:rPr lang="en-US" dirty="0" smtClean="0"/>
-              <a:t>Dynamic (types of variables can be changed)</a:t>
+              <a:t>Boolean</a:t>
             </a:r>
           </a:p>
           <a:p>
@@ -6654,9 +7993,8 @@
             </a:pPr>
             <a:r>
               <a:rPr lang="en-US" dirty="0" smtClean="0"/>
-              <a:t>Imperative</a:t>
-            </a:r>
-            <a:endParaRPr lang="en-US" dirty="0" smtClean="0"/>
+              <a:t>Number</a:t>
+            </a:r>
           </a:p>
           <a:p>
             <a:pPr marL="608013" lvl="1" indent="-342900">
@@ -6665,17 +8003,7 @@
             </a:pPr>
             <a:r>
               <a:rPr lang="en-US" dirty="0" smtClean="0"/>
-              <a:t>Object-oriented (prototype based)</a:t>
-            </a:r>
-          </a:p>
-          <a:p>
-            <a:pPr marL="881063" lvl="2" indent="-342900">
-              <a:buFont typeface="Arial" panose="020B0604020202020204" pitchFamily="34" charset="0"/>
-              <a:buChar char="•"/>
-            </a:pPr>
-            <a:r>
-              <a:rPr lang="en-US" dirty="0" smtClean="0"/>
-              <a:t>Objects created by cloning existing objects and extending them</a:t>
+              <a:t>String</a:t>
             </a:r>
           </a:p>
           <a:p>
@@ -6684,65 +8012,67 @@
               <a:buChar char="•"/>
             </a:pPr>
             <a:r>
-              <a:rPr lang="en-US" dirty="0"/>
-              <a:t>Functional</a:t>
-            </a:r>
-          </a:p>
-          <a:p>
-            <a:pPr marL="881063" lvl="2" indent="-342900">
+              <a:rPr lang="en-US" dirty="0" smtClean="0"/>
+              <a:t>Null</a:t>
+            </a:r>
+          </a:p>
+          <a:p>
+            <a:pPr marL="608013" lvl="1" indent="-342900">
               <a:buFont typeface="Arial" panose="020B0604020202020204" pitchFamily="34" charset="0"/>
               <a:buChar char="•"/>
             </a:pPr>
             <a:r>
-              <a:rPr lang="en-US" dirty="0"/>
-              <a:t>Everything is a function (even objects)</a:t>
-            </a:r>
-          </a:p>
-          <a:p>
-            <a:pPr marL="881063" lvl="2" indent="-342900">
+              <a:rPr lang="en-US" dirty="0" smtClean="0"/>
+              <a:t>Undefined</a:t>
+            </a:r>
+          </a:p>
+          <a:p>
+            <a:pPr marL="342900" indent="-342900">
               <a:buFont typeface="Arial" panose="020B0604020202020204" pitchFamily="34" charset="0"/>
               <a:buChar char="•"/>
             </a:pPr>
             <a:r>
-              <a:rPr lang="en-US" dirty="0"/>
-              <a:t>Function is a </a:t>
-            </a:r>
-            <a:r>
-              <a:rPr lang="en-US" dirty="0" smtClean="0"/>
-              <a:t>“base type” </a:t>
-            </a:r>
-            <a:r>
-              <a:rPr lang="en-US" dirty="0"/>
-              <a:t>(like </a:t>
-            </a:r>
-            <a:r>
-              <a:rPr lang="en-US" b="1" dirty="0"/>
-              <a:t>object</a:t>
-            </a:r>
-            <a:r>
-              <a:rPr lang="en-US" dirty="0"/>
-              <a:t> in C# &amp; JAVA</a:t>
-            </a:r>
-            <a:r>
-              <a:rPr lang="en-US" dirty="0" smtClean="0"/>
-              <a:t>)</a:t>
-            </a:r>
-          </a:p>
-          <a:p>
-            <a:pPr marL="881063" lvl="2" indent="-342900">
+              <a:rPr lang="en-US" dirty="0" smtClean="0"/>
+              <a:t>Function</a:t>
+            </a:r>
+          </a:p>
+          <a:p>
+            <a:pPr marL="342900" indent="-342900">
+              <a:buFont typeface="Arial" panose="020B0604020202020204" pitchFamily="34" charset="0"/>
+              <a:buChar char="•"/>
+            </a:pPr>
+            <a:r>
+              <a:rPr lang="en-US" dirty="0" smtClean="0"/>
+              <a:t>Object</a:t>
+            </a:r>
+          </a:p>
+          <a:p>
+            <a:pPr marL="342900" indent="-342900">
               <a:buFont typeface="Arial" panose="020B0604020202020204" pitchFamily="34" charset="0"/>
               <a:buChar char="•"/>
             </a:pPr>
             <a:endParaRPr lang="en-US" dirty="0"/>
           </a:p>
-          <a:p>
-            <a:pPr marL="608013" lvl="1" indent="-342900">
-              <a:buFont typeface="Arial" panose="020B0604020202020204" pitchFamily="34" charset="0"/>
-              <a:buChar char="•"/>
-            </a:pPr>
-            <a:r>
-              <a:rPr lang="en-US" dirty="0" smtClean="0"/>
-              <a:t>Run in web browser script engine</a:t>
+        </p:txBody>
+      </p:sp>
+      <p:sp>
+        <p:nvSpPr>
+          <p:cNvPr id="4" name="Date Placeholder 3"/>
+          <p:cNvSpPr>
+            <a:spLocks noGrp="1"/>
+          </p:cNvSpPr>
+          <p:nvPr>
+            <p:ph type="dt" sz="half" idx="10"/>
+          </p:nvPr>
+        </p:nvSpPr>
+        <p:spPr/>
+        <p:txBody>
+          <a:bodyPr/>
+          <a:lstStyle/>
+          <a:p>
+            <a:r>
+              <a:rPr lang="en-US" dirty="0" smtClean="0"/>
+              <a:t>14. August 2015</a:t>
             </a:r>
             <a:endParaRPr lang="en-US" dirty="0"/>
           </a:p>
@@ -6763,25 +8093,13 @@
           <a:bodyPr/>
           <a:lstStyle/>
           <a:p>
-            <a:r>
-              <a:rPr lang="en-US" dirty="0"/>
-              <a:t>JavaScript is the </a:t>
-            </a:r>
-            <a:r>
-              <a:rPr lang="en-US" dirty="0" smtClean="0"/>
-              <a:t>programming (script) </a:t>
-            </a:r>
-            <a:r>
-              <a:rPr lang="en-US" dirty="0"/>
-              <a:t>language of HTML and the Web.</a:t>
-            </a:r>
             <a:endParaRPr lang="en-US" dirty="0"/>
           </a:p>
         </p:txBody>
       </p:sp>
       <p:sp>
         <p:nvSpPr>
-          <p:cNvPr id="9" name="Footer Placeholder 8"/>
+          <p:cNvPr id="7" name="Footer Placeholder 6"/>
           <p:cNvSpPr>
             <a:spLocks noGrp="1"/>
           </p:cNvSpPr>
@@ -6795,21 +8113,45 @@
           <a:lstStyle/>
           <a:p>
             <a:r>
-              <a:rPr lang="de-CH" smtClean="0"/>
-              <a:t>Javascript Basics | nesp, stmi, mabo</a:t>
-            </a:r>
-            <a:endParaRPr lang="de-CH" dirty="0"/>
-          </a:p>
-        </p:txBody>
-      </p:sp>
-      <p:sp>
-        <p:nvSpPr>
-          <p:cNvPr id="10" name="Date Placeholder 9"/>
-          <p:cNvSpPr>
-            <a:spLocks noGrp="1"/>
-          </p:cNvSpPr>
-          <p:nvPr>
-            <p:ph type="dt" sz="half" idx="10"/>
+              <a:rPr lang="en-US" dirty="0" err="1" smtClean="0"/>
+              <a:t>Javascript</a:t>
+            </a:r>
+            <a:r>
+              <a:rPr lang="en-US" dirty="0" smtClean="0"/>
+              <a:t> Basics | </a:t>
+            </a:r>
+            <a:r>
+              <a:rPr lang="en-US" dirty="0" err="1" smtClean="0"/>
+              <a:t>nesp</a:t>
+            </a:r>
+            <a:r>
+              <a:rPr lang="en-US" dirty="0" smtClean="0"/>
+              <a:t>, </a:t>
+            </a:r>
+            <a:r>
+              <a:rPr lang="en-US" dirty="0" err="1" smtClean="0"/>
+              <a:t>stmi</a:t>
+            </a:r>
+            <a:r>
+              <a:rPr lang="en-US" dirty="0" smtClean="0"/>
+              <a:t>, </a:t>
+            </a:r>
+            <a:r>
+              <a:rPr lang="en-US" dirty="0" err="1" smtClean="0"/>
+              <a:t>mabo</a:t>
+            </a:r>
+            <a:endParaRPr lang="en-US" dirty="0"/>
+          </a:p>
+        </p:txBody>
+      </p:sp>
+      <p:sp>
+        <p:nvSpPr>
+          <p:cNvPr id="9" name="Slide Number Placeholder 8"/>
+          <p:cNvSpPr>
+            <a:spLocks noGrp="1"/>
+          </p:cNvSpPr>
+          <p:nvPr>
+            <p:ph type="sldNum" sz="quarter" idx="12"/>
           </p:nvPr>
         </p:nvSpPr>
         <p:spPr/>
@@ -6818,37 +8160,15 @@
           <a:lstStyle/>
           <a:p>
             <a:r>
-              <a:rPr lang="de-CH" smtClean="0"/>
-              <a:t>14. August 2015</a:t>
-            </a:r>
-            <a:endParaRPr lang="de-CH" dirty="0"/>
-          </a:p>
-        </p:txBody>
-      </p:sp>
-      <p:sp>
-        <p:nvSpPr>
-          <p:cNvPr id="11" name="Slide Number Placeholder 10"/>
-          <p:cNvSpPr>
-            <a:spLocks noGrp="1"/>
-          </p:cNvSpPr>
-          <p:nvPr>
-            <p:ph type="sldNum" sz="quarter" idx="12"/>
-          </p:nvPr>
-        </p:nvSpPr>
-        <p:spPr/>
-        <p:txBody>
-          <a:bodyPr/>
-          <a:lstStyle/>
-          <a:p>
-            <a:r>
-              <a:rPr lang="de-CH" smtClean="0"/>
+              <a:rPr lang="en-GB" smtClean="0"/>
               <a:t>Slide </a:t>
             </a:r>
-            <a:fld id="{82695712-81D7-44C7-8097-285E2E69108D}" type="slidenum">
-              <a:rPr lang="de-CH" smtClean="0"/>
+            <a:fld id="{B945A87F-2CE4-4B6D-B6BF-F6BF6C5CB292}" type="slidenum">
+              <a:rPr smtClean="0"/>
+              <a:pPr/>
               <a:t>3</a:t>
             </a:fld>
-            <a:endParaRPr lang="de-CH" dirty="0"/>
+            <a:endParaRPr dirty="0"/>
           </a:p>
         </p:txBody>
       </p:sp>
@@ -6899,11 +8219,7 @@
           <a:p>
             <a:r>
               <a:rPr lang="en-US" dirty="0" smtClean="0"/>
-              <a:t>Data t</a:t>
-            </a:r>
-            <a:r>
-              <a:rPr lang="en-US" dirty="0" smtClean="0"/>
-              <a:t>ypes</a:t>
+              <a:t>Equality &amp; casting</a:t>
             </a:r>
             <a:endParaRPr lang="en-US" dirty="0"/>
           </a:p>
@@ -6929,58 +8245,12 @@
               <a:buChar char="•"/>
             </a:pPr>
             <a:r>
-              <a:rPr lang="en-US" dirty="0" smtClean="0"/>
-              <a:t>Primitives:</a:t>
-            </a:r>
-          </a:p>
-          <a:p>
-            <a:pPr marL="608013" lvl="1" indent="-342900">
-              <a:buFont typeface="Arial" panose="020B0604020202020204" pitchFamily="34" charset="0"/>
-              <a:buChar char="•"/>
-            </a:pPr>
-            <a:r>
-              <a:rPr lang="en-US" dirty="0" smtClean="0"/>
-              <a:t>Boolean</a:t>
-            </a:r>
-          </a:p>
-          <a:p>
-            <a:pPr marL="608013" lvl="1" indent="-342900">
-              <a:buFont typeface="Arial" panose="020B0604020202020204" pitchFamily="34" charset="0"/>
-              <a:buChar char="•"/>
-            </a:pPr>
-            <a:r>
-              <a:rPr lang="en-US" dirty="0" smtClean="0"/>
-              <a:t>Number</a:t>
-            </a:r>
-          </a:p>
-          <a:p>
-            <a:pPr marL="608013" lvl="1" indent="-342900">
-              <a:buFont typeface="Arial" panose="020B0604020202020204" pitchFamily="34" charset="0"/>
-              <a:buChar char="•"/>
-            </a:pPr>
-            <a:r>
-              <a:rPr lang="en-US" dirty="0" smtClean="0"/>
-              <a:t>String</a:t>
-            </a:r>
-          </a:p>
-          <a:p>
-            <a:pPr marL="608013" lvl="1" indent="-342900">
-              <a:buFont typeface="Arial" panose="020B0604020202020204" pitchFamily="34" charset="0"/>
-              <a:buChar char="•"/>
-            </a:pPr>
-            <a:r>
-              <a:rPr lang="en-US" dirty="0" smtClean="0"/>
-              <a:t>Null</a:t>
-            </a:r>
-          </a:p>
-          <a:p>
-            <a:pPr marL="608013" lvl="1" indent="-342900">
-              <a:buFont typeface="Arial" panose="020B0604020202020204" pitchFamily="34" charset="0"/>
-              <a:buChar char="•"/>
-            </a:pPr>
-            <a:r>
-              <a:rPr lang="en-US" dirty="0" smtClean="0"/>
-              <a:t>Undefined</a:t>
+              <a:rPr lang="en-US" dirty="0"/>
+              <a:t>T</a:t>
+            </a:r>
+            <a:r>
+              <a:rPr lang="en-US" dirty="0" smtClean="0"/>
+              <a:t>rue: 4 == “4”</a:t>
             </a:r>
           </a:p>
           <a:p>
@@ -6990,19 +8260,8 @@
             </a:pPr>
             <a:r>
               <a:rPr lang="en-US" dirty="0" smtClean="0"/>
-              <a:t>Function</a:t>
-            </a:r>
-          </a:p>
-          <a:p>
-            <a:pPr marL="342900" indent="-342900">
-              <a:buFont typeface="Arial" panose="020B0604020202020204" pitchFamily="34" charset="0"/>
-              <a:buChar char="•"/>
-            </a:pPr>
-            <a:r>
-              <a:rPr lang="en-US" dirty="0" smtClean="0"/>
-              <a:t>Object</a:t>
-            </a:r>
-            <a:endParaRPr lang="en-US" dirty="0" smtClean="0"/>
+              <a:t>False: 4 === “4”</a:t>
+            </a:r>
           </a:p>
           <a:p>
             <a:pPr marL="342900" indent="-342900">
@@ -7011,6 +8270,37 @@
             </a:pPr>
             <a:endParaRPr lang="en-US" dirty="0"/>
           </a:p>
+          <a:p>
+            <a:pPr marL="342900" indent="-342900">
+              <a:buFont typeface="Arial" panose="020B0604020202020204" pitchFamily="34" charset="0"/>
+              <a:buChar char="•"/>
+            </a:pPr>
+            <a:r>
+              <a:rPr lang="en-US" dirty="0" err="1" smtClean="0"/>
+              <a:t>var</a:t>
+            </a:r>
+            <a:r>
+              <a:rPr lang="en-US" dirty="0" smtClean="0"/>
+              <a:t> a = Number(“4”)</a:t>
+            </a:r>
+          </a:p>
+          <a:p>
+            <a:pPr marL="342900" indent="-342900">
+              <a:buFont typeface="Arial" panose="020B0604020202020204" pitchFamily="34" charset="0"/>
+              <a:buChar char="•"/>
+            </a:pPr>
+            <a:r>
+              <a:rPr lang="en-US" dirty="0" smtClean="0"/>
+              <a:t>a === 4</a:t>
+            </a:r>
+          </a:p>
+          <a:p>
+            <a:pPr marL="342900" indent="-342900">
+              <a:buFont typeface="Arial" panose="020B0604020202020204" pitchFamily="34" charset="0"/>
+              <a:buChar char="•"/>
+            </a:pPr>
+            <a:endParaRPr lang="en-US" dirty="0"/>
+          </a:p>
         </p:txBody>
       </p:sp>
       <p:sp>
@@ -7029,82 +8319,62 @@
           <a:lstStyle/>
           <a:p>
             <a:r>
-              <a:rPr lang="en-US" dirty="0" smtClean="0"/>
+              <a:rPr lang="de-CH" smtClean="0"/>
               <a:t>14. August 2015</a:t>
             </a:r>
+            <a:endParaRPr lang="de-CH" dirty="0"/>
+          </a:p>
+        </p:txBody>
+      </p:sp>
+      <p:sp>
+        <p:nvSpPr>
+          <p:cNvPr id="5" name="Footer Placeholder 4"/>
+          <p:cNvSpPr>
+            <a:spLocks noGrp="1"/>
+          </p:cNvSpPr>
+          <p:nvPr>
+            <p:ph type="ftr" sz="quarter" idx="11"/>
+          </p:nvPr>
+        </p:nvSpPr>
+        <p:spPr/>
+        <p:txBody>
+          <a:bodyPr/>
+          <a:lstStyle/>
+          <a:p>
+            <a:r>
+              <a:rPr lang="de-CH" smtClean="0"/>
+              <a:t>Javascript Basics | nesp, stmi, mabo</a:t>
+            </a:r>
+            <a:endParaRPr lang="de-CH" dirty="0"/>
+          </a:p>
+        </p:txBody>
+      </p:sp>
+      <p:sp>
+        <p:nvSpPr>
+          <p:cNvPr id="7" name="Text Placeholder 6"/>
+          <p:cNvSpPr>
+            <a:spLocks noGrp="1"/>
+          </p:cNvSpPr>
+          <p:nvPr>
+            <p:ph type="body" sz="quarter" idx="13"/>
+          </p:nvPr>
+        </p:nvSpPr>
+        <p:spPr/>
+        <p:txBody>
+          <a:bodyPr/>
+          <a:lstStyle/>
+          <a:p>
+            <a:r>
+              <a:rPr lang="en-US" dirty="0" smtClean="0"/>
+              <a:t>Strict “===“ vs Loose “==“</a:t>
+            </a:r>
             <a:endParaRPr lang="en-US" dirty="0"/>
           </a:p>
         </p:txBody>
       </p:sp>
       <p:sp>
         <p:nvSpPr>
-          <p:cNvPr id="6" name="Text Placeholder 5"/>
-          <p:cNvSpPr>
-            <a:spLocks noGrp="1"/>
-          </p:cNvSpPr>
-          <p:nvPr>
-            <p:ph type="body" sz="quarter" idx="13"/>
-          </p:nvPr>
-        </p:nvSpPr>
-        <p:spPr/>
-        <p:txBody>
-          <a:bodyPr/>
-          <a:lstStyle/>
-          <a:p>
-            <a:endParaRPr lang="en-US" dirty="0"/>
-          </a:p>
-        </p:txBody>
-      </p:sp>
-      <p:sp>
-        <p:nvSpPr>
-          <p:cNvPr id="7" name="Footer Placeholder 6"/>
-          <p:cNvSpPr>
-            <a:spLocks noGrp="1"/>
-          </p:cNvSpPr>
-          <p:nvPr>
-            <p:ph type="ftr" sz="quarter" idx="11"/>
-          </p:nvPr>
-        </p:nvSpPr>
-        <p:spPr/>
-        <p:txBody>
-          <a:bodyPr/>
-          <a:lstStyle/>
-          <a:p>
-            <a:r>
-              <a:rPr lang="en-US" dirty="0" err="1" smtClean="0"/>
-              <a:t>Javascript</a:t>
-            </a:r>
-            <a:r>
-              <a:rPr lang="en-US" dirty="0" smtClean="0"/>
-              <a:t> Basics | </a:t>
-            </a:r>
-            <a:r>
-              <a:rPr lang="en-US" dirty="0" err="1" smtClean="0"/>
-              <a:t>nesp</a:t>
-            </a:r>
-            <a:r>
-              <a:rPr lang="en-US" dirty="0" smtClean="0"/>
-              <a:t>, </a:t>
-            </a:r>
-            <a:r>
-              <a:rPr lang="en-US" dirty="0" err="1" smtClean="0"/>
-              <a:t>stmi</a:t>
-            </a:r>
-            <a:r>
-              <a:rPr lang="en-US" dirty="0" smtClean="0"/>
-              <a:t>, </a:t>
-            </a:r>
-            <a:r>
-              <a:rPr lang="en-US" dirty="0" err="1" smtClean="0"/>
-              <a:t>mabo</a:t>
-            </a:r>
-            <a:endParaRPr lang="en-US" dirty="0"/>
-          </a:p>
-        </p:txBody>
-      </p:sp>
-      <p:sp>
-        <p:nvSpPr>
-          <p:cNvPr id="9" name="Slide Number Placeholder 8"/>
+          <p:cNvPr id="8" name="Slide Number Placeholder 7"/>
           <p:cNvSpPr>
             <a:spLocks noGrp="1"/>
           </p:cNvSpPr>
@@ -7133,7 +8403,7 @@
     </p:spTree>
     <p:extLst>
       <p:ext uri="{BB962C8B-B14F-4D97-AF65-F5344CB8AC3E}">
-        <p14:creationId xmlns:p14="http://schemas.microsoft.com/office/powerpoint/2010/main" val="2884851122"/>
+        <p14:creationId xmlns:p14="http://schemas.microsoft.com/office/powerpoint/2010/main" val="4036073287"/>
       </p:ext>
     </p:extLst>
   </p:cSld>
@@ -7176,234 +8446,6 @@
           <a:lstStyle/>
           <a:p>
             <a:r>
-              <a:rPr lang="en-US" dirty="0" smtClean="0"/>
-              <a:t>Equality &amp; casting</a:t>
-            </a:r>
-            <a:endParaRPr lang="en-US" dirty="0"/>
-          </a:p>
-        </p:txBody>
-      </p:sp>
-      <p:sp>
-        <p:nvSpPr>
-          <p:cNvPr id="3" name="Content Placeholder 2"/>
-          <p:cNvSpPr>
-            <a:spLocks noGrp="1"/>
-          </p:cNvSpPr>
-          <p:nvPr>
-            <p:ph idx="1"/>
-          </p:nvPr>
-        </p:nvSpPr>
-        <p:spPr/>
-        <p:txBody>
-          <a:bodyPr/>
-          <a:lstStyle/>
-          <a:p>
-            <a:pPr marL="342900" indent="-342900">
-              <a:buFont typeface="Arial" panose="020B0604020202020204" pitchFamily="34" charset="0"/>
-              <a:buChar char="•"/>
-            </a:pPr>
-            <a:r>
-              <a:rPr lang="en-US" dirty="0"/>
-              <a:t>T</a:t>
-            </a:r>
-            <a:r>
-              <a:rPr lang="en-US" dirty="0" smtClean="0"/>
-              <a:t>rue: 4 == “4”</a:t>
-            </a:r>
-          </a:p>
-          <a:p>
-            <a:pPr marL="342900" indent="-342900">
-              <a:buFont typeface="Arial" panose="020B0604020202020204" pitchFamily="34" charset="0"/>
-              <a:buChar char="•"/>
-            </a:pPr>
-            <a:r>
-              <a:rPr lang="en-US" dirty="0" smtClean="0"/>
-              <a:t>False: 4 === “4”</a:t>
-            </a:r>
-          </a:p>
-          <a:p>
-            <a:pPr marL="342900" indent="-342900">
-              <a:buFont typeface="Arial" panose="020B0604020202020204" pitchFamily="34" charset="0"/>
-              <a:buChar char="•"/>
-            </a:pPr>
-            <a:endParaRPr lang="en-US" dirty="0"/>
-          </a:p>
-          <a:p>
-            <a:pPr marL="342900" indent="-342900">
-              <a:buFont typeface="Arial" panose="020B0604020202020204" pitchFamily="34" charset="0"/>
-              <a:buChar char="•"/>
-            </a:pPr>
-            <a:r>
-              <a:rPr lang="en-US" dirty="0" err="1" smtClean="0"/>
-              <a:t>var</a:t>
-            </a:r>
-            <a:r>
-              <a:rPr lang="en-US" dirty="0" smtClean="0"/>
-              <a:t> a = Number(“4”)</a:t>
-            </a:r>
-          </a:p>
-          <a:p>
-            <a:pPr marL="342900" indent="-342900">
-              <a:buFont typeface="Arial" panose="020B0604020202020204" pitchFamily="34" charset="0"/>
-              <a:buChar char="•"/>
-            </a:pPr>
-            <a:r>
-              <a:rPr lang="en-US" dirty="0" smtClean="0"/>
-              <a:t>a === 4</a:t>
-            </a:r>
-          </a:p>
-          <a:p>
-            <a:pPr marL="342900" indent="-342900">
-              <a:buFont typeface="Arial" panose="020B0604020202020204" pitchFamily="34" charset="0"/>
-              <a:buChar char="•"/>
-            </a:pPr>
-            <a:endParaRPr lang="en-US" dirty="0"/>
-          </a:p>
-        </p:txBody>
-      </p:sp>
-      <p:sp>
-        <p:nvSpPr>
-          <p:cNvPr id="4" name="Date Placeholder 3"/>
-          <p:cNvSpPr>
-            <a:spLocks noGrp="1"/>
-          </p:cNvSpPr>
-          <p:nvPr>
-            <p:ph type="dt" sz="half" idx="10"/>
-          </p:nvPr>
-        </p:nvSpPr>
-        <p:spPr/>
-        <p:txBody>
-          <a:bodyPr/>
-          <a:lstStyle/>
-          <a:p>
-            <a:r>
-              <a:rPr lang="de-CH" smtClean="0"/>
-              <a:t>14. August 2015</a:t>
-            </a:r>
-            <a:endParaRPr lang="de-CH" dirty="0"/>
-          </a:p>
-        </p:txBody>
-      </p:sp>
-      <p:sp>
-        <p:nvSpPr>
-          <p:cNvPr id="5" name="Footer Placeholder 4"/>
-          <p:cNvSpPr>
-            <a:spLocks noGrp="1"/>
-          </p:cNvSpPr>
-          <p:nvPr>
-            <p:ph type="ftr" sz="quarter" idx="11"/>
-          </p:nvPr>
-        </p:nvSpPr>
-        <p:spPr/>
-        <p:txBody>
-          <a:bodyPr/>
-          <a:lstStyle/>
-          <a:p>
-            <a:r>
-              <a:rPr lang="de-CH" smtClean="0"/>
-              <a:t>Javascript Basics | nesp, stmi, mabo</a:t>
-            </a:r>
-            <a:endParaRPr lang="de-CH" dirty="0"/>
-          </a:p>
-        </p:txBody>
-      </p:sp>
-      <p:sp>
-        <p:nvSpPr>
-          <p:cNvPr id="7" name="Text Placeholder 6"/>
-          <p:cNvSpPr>
-            <a:spLocks noGrp="1"/>
-          </p:cNvSpPr>
-          <p:nvPr>
-            <p:ph type="body" sz="quarter" idx="13"/>
-          </p:nvPr>
-        </p:nvSpPr>
-        <p:spPr/>
-        <p:txBody>
-          <a:bodyPr/>
-          <a:lstStyle/>
-          <a:p>
-            <a:r>
-              <a:rPr lang="en-US" dirty="0" smtClean="0"/>
-              <a:t>Strict “===“ vs Loose “==“</a:t>
-            </a:r>
-            <a:endParaRPr lang="en-US" dirty="0"/>
-          </a:p>
-        </p:txBody>
-      </p:sp>
-      <p:sp>
-        <p:nvSpPr>
-          <p:cNvPr id="8" name="Slide Number Placeholder 7"/>
-          <p:cNvSpPr>
-            <a:spLocks noGrp="1"/>
-          </p:cNvSpPr>
-          <p:nvPr>
-            <p:ph type="sldNum" sz="quarter" idx="12"/>
-          </p:nvPr>
-        </p:nvSpPr>
-        <p:spPr/>
-        <p:txBody>
-          <a:bodyPr/>
-          <a:lstStyle/>
-          <a:p>
-            <a:r>
-              <a:rPr lang="en-GB" smtClean="0"/>
-              <a:t>Slide </a:t>
-            </a:r>
-            <a:fld id="{B945A87F-2CE4-4B6D-B6BF-F6BF6C5CB292}" type="slidenum">
-              <a:rPr smtClean="0"/>
-              <a:pPr/>
-              <a:t>5</a:t>
-            </a:fld>
-            <a:endParaRPr dirty="0"/>
-          </a:p>
-        </p:txBody>
-      </p:sp>
-    </p:spTree>
-    <p:extLst>
-      <p:ext uri="{BB962C8B-B14F-4D97-AF65-F5344CB8AC3E}">
-        <p14:creationId xmlns:p14="http://schemas.microsoft.com/office/powerpoint/2010/main" val="4036073287"/>
-      </p:ext>
-    </p:extLst>
-  </p:cSld>
-  <p:clrMapOvr>
-    <a:masterClrMapping/>
-  </p:clrMapOvr>
-</p:sld>
-</file>
-
-<file path=ppt/slides/slide6.xml><?xml version="1.0" encoding="utf-8"?>
-<p:sld xmlns:a="http://schemas.openxmlformats.org/drawingml/2006/main" xmlns:r="http://schemas.openxmlformats.org/officeDocument/2006/relationships" xmlns:p="http://schemas.openxmlformats.org/presentationml/2006/main">
-  <p:cSld>
-    <p:spTree>
-      <p:nvGrpSpPr>
-        <p:cNvPr id="1" name=""/>
-        <p:cNvGrpSpPr/>
-        <p:nvPr/>
-      </p:nvGrpSpPr>
-      <p:grpSpPr>
-        <a:xfrm>
-          <a:off x="0" y="0"/>
-          <a:ext cx="0" cy="0"/>
-          <a:chOff x="0" y="0"/>
-          <a:chExt cx="0" cy="0"/>
-        </a:xfrm>
-      </p:grpSpPr>
-      <p:sp>
-        <p:nvSpPr>
-          <p:cNvPr id="2" name="Title 1"/>
-          <p:cNvSpPr>
-            <a:spLocks noGrp="1"/>
-          </p:cNvSpPr>
-          <p:nvPr>
-            <p:ph type="title"/>
-          </p:nvPr>
-        </p:nvSpPr>
-        <p:spPr/>
-        <p:txBody>
-          <a:bodyPr/>
-          <a:lstStyle/>
-          <a:p>
-            <a:r>
               <a:rPr lang="en-US" dirty="0" err="1" smtClean="0"/>
               <a:t>Truthy</a:t>
             </a:r>
@@ -7505,11 +8547,7 @@
             </a:pPr>
             <a:r>
               <a:rPr lang="en-US" dirty="0" smtClean="0"/>
-              <a:t>0 &amp; </a:t>
-            </a:r>
-            <a:r>
-              <a:rPr lang="en-US" dirty="0" smtClean="0"/>
-              <a:t>-0</a:t>
+              <a:t>0 &amp; -0</a:t>
             </a:r>
           </a:p>
           <a:p>
@@ -7529,11 +8567,7 @@
             </a:pPr>
             <a:r>
               <a:rPr lang="en-US" dirty="0" smtClean="0"/>
-              <a:t>null &amp; </a:t>
-            </a:r>
-            <a:r>
-              <a:rPr lang="en-US" dirty="0" smtClean="0"/>
-              <a:t>undefined</a:t>
+              <a:t>null &amp; undefined</a:t>
             </a:r>
           </a:p>
           <a:p>
@@ -7649,7 +8683,7 @@
             </a:r>
             <a:fld id="{FB565871-C227-4467-8A69-9EBAF738B0FF}" type="slidenum">
               <a:rPr lang="de-CH" smtClean="0"/>
-              <a:t>6</a:t>
+              <a:t>5</a:t>
             </a:fld>
             <a:endParaRPr lang="de-CH" dirty="0"/>
           </a:p>
@@ -7933,7 +8967,7 @@
 </p:sld>
 </file>
 
-<file path=ppt/slides/slide7.xml><?xml version="1.0" encoding="utf-8"?>
+<file path=ppt/slides/slide6.xml><?xml version="1.0" encoding="utf-8"?>
 <p:sld xmlns:a="http://schemas.openxmlformats.org/drawingml/2006/main" xmlns:r="http://schemas.openxmlformats.org/officeDocument/2006/relationships" xmlns:p="http://schemas.openxmlformats.org/presentationml/2006/main">
   <p:cSld>
     <p:spTree>
@@ -9683,7 +10717,7 @@
                     <a:p>
                       <a:pPr algn="l"/>
                       <a:r>
-                        <a:rPr lang="en-GB" sz="1300">
+                        <a:rPr lang="en-GB" sz="1300" dirty="0">
                           <a:effectLst/>
                         </a:rPr>
                         <a:t>?:</a:t>
@@ -9984,6 +11018,270 @@
               <a:rPr lang="en-US" dirty="0" smtClean="0"/>
               <a:t>14. August 2015</a:t>
             </a:r>
+            <a:endParaRPr lang="en-US" dirty="0"/>
+          </a:p>
+        </p:txBody>
+      </p:sp>
+      <p:sp>
+        <p:nvSpPr>
+          <p:cNvPr id="7" name="Footer Placeholder 6"/>
+          <p:cNvSpPr>
+            <a:spLocks noGrp="1"/>
+          </p:cNvSpPr>
+          <p:nvPr>
+            <p:ph type="ftr" sz="quarter" idx="11"/>
+          </p:nvPr>
+        </p:nvSpPr>
+        <p:spPr/>
+        <p:txBody>
+          <a:bodyPr/>
+          <a:lstStyle/>
+          <a:p>
+            <a:r>
+              <a:rPr lang="en-US" dirty="0" err="1" smtClean="0"/>
+              <a:t>Javascript</a:t>
+            </a:r>
+            <a:r>
+              <a:rPr lang="en-US" dirty="0" smtClean="0"/>
+              <a:t> Basics | </a:t>
+            </a:r>
+            <a:r>
+              <a:rPr lang="en-US" dirty="0" err="1" smtClean="0"/>
+              <a:t>nesp</a:t>
+            </a:r>
+            <a:r>
+              <a:rPr lang="en-US" dirty="0" smtClean="0"/>
+              <a:t>, </a:t>
+            </a:r>
+            <a:r>
+              <a:rPr lang="en-US" dirty="0" err="1" smtClean="0"/>
+              <a:t>stmi</a:t>
+            </a:r>
+            <a:r>
+              <a:rPr lang="en-US" dirty="0" smtClean="0"/>
+              <a:t>, </a:t>
+            </a:r>
+            <a:r>
+              <a:rPr lang="en-US" dirty="0" err="1" smtClean="0"/>
+              <a:t>mabo</a:t>
+            </a:r>
+            <a:endParaRPr lang="en-US" dirty="0"/>
+          </a:p>
+        </p:txBody>
+      </p:sp>
+      <p:sp>
+        <p:nvSpPr>
+          <p:cNvPr id="9" name="Slide Number Placeholder 8"/>
+          <p:cNvSpPr>
+            <a:spLocks noGrp="1"/>
+          </p:cNvSpPr>
+          <p:nvPr>
+            <p:ph type="sldNum" sz="quarter" idx="12"/>
+          </p:nvPr>
+        </p:nvSpPr>
+        <p:spPr/>
+        <p:txBody>
+          <a:bodyPr/>
+          <a:lstStyle/>
+          <a:p>
+            <a:r>
+              <a:rPr lang="en-GB" smtClean="0"/>
+              <a:t>Slide </a:t>
+            </a:r>
+            <a:fld id="{B945A87F-2CE4-4B6D-B6BF-F6BF6C5CB292}" type="slidenum">
+              <a:rPr smtClean="0"/>
+              <a:pPr/>
+              <a:t>6</a:t>
+            </a:fld>
+            <a:endParaRPr dirty="0"/>
+          </a:p>
+        </p:txBody>
+      </p:sp>
+    </p:spTree>
+    <p:extLst>
+      <p:ext uri="{BB962C8B-B14F-4D97-AF65-F5344CB8AC3E}">
+        <p14:creationId xmlns:p14="http://schemas.microsoft.com/office/powerpoint/2010/main" val="2884851122"/>
+      </p:ext>
+    </p:extLst>
+  </p:cSld>
+  <p:clrMapOvr>
+    <a:masterClrMapping/>
+  </p:clrMapOvr>
+</p:sld>
+</file>
+
+<file path=ppt/slides/slide7.xml><?xml version="1.0" encoding="utf-8"?>
+<p:sld xmlns:a="http://schemas.openxmlformats.org/drawingml/2006/main" xmlns:r="http://schemas.openxmlformats.org/officeDocument/2006/relationships" xmlns:p="http://schemas.openxmlformats.org/presentationml/2006/main">
+  <p:cSld>
+    <p:spTree>
+      <p:nvGrpSpPr>
+        <p:cNvPr id="1" name=""/>
+        <p:cNvGrpSpPr/>
+        <p:nvPr/>
+      </p:nvGrpSpPr>
+      <p:grpSpPr>
+        <a:xfrm>
+          <a:off x="0" y="0"/>
+          <a:ext cx="0" cy="0"/>
+          <a:chOff x="0" y="0"/>
+          <a:chExt cx="0" cy="0"/>
+        </a:xfrm>
+      </p:grpSpPr>
+      <p:sp>
+        <p:nvSpPr>
+          <p:cNvPr id="2" name="Title 1"/>
+          <p:cNvSpPr>
+            <a:spLocks noGrp="1"/>
+          </p:cNvSpPr>
+          <p:nvPr>
+            <p:ph type="title"/>
+          </p:nvPr>
+        </p:nvSpPr>
+        <p:spPr/>
+        <p:txBody>
+          <a:bodyPr/>
+          <a:lstStyle/>
+          <a:p>
+            <a:r>
+              <a:rPr lang="en-US" dirty="0" smtClean="0"/>
+              <a:t>Member operator</a:t>
+            </a:r>
+            <a:endParaRPr lang="en-US" dirty="0"/>
+          </a:p>
+        </p:txBody>
+      </p:sp>
+      <p:sp>
+        <p:nvSpPr>
+          <p:cNvPr id="3" name="Content Placeholder 2"/>
+          <p:cNvSpPr>
+            <a:spLocks noGrp="1"/>
+          </p:cNvSpPr>
+          <p:nvPr>
+            <p:ph idx="1"/>
+          </p:nvPr>
+        </p:nvSpPr>
+        <p:spPr/>
+        <p:txBody>
+          <a:bodyPr/>
+          <a:lstStyle/>
+          <a:p>
+            <a:pPr marL="342900" indent="-342900">
+              <a:buFont typeface="Arial" panose="020B0604020202020204" pitchFamily="34" charset="0"/>
+              <a:buChar char="•"/>
+            </a:pPr>
+            <a:r>
+              <a:rPr lang="en-US" dirty="0" smtClean="0"/>
+              <a:t>In array: </a:t>
+            </a:r>
+            <a:r>
+              <a:rPr lang="en-US" dirty="0" err="1" smtClean="0"/>
+              <a:t>arr</a:t>
+            </a:r>
+            <a:r>
+              <a:rPr lang="en-US" dirty="0" smtClean="0"/>
+              <a:t>[4]</a:t>
+            </a:r>
+          </a:p>
+          <a:p>
+            <a:pPr marL="342900" indent="-342900">
+              <a:buFont typeface="Arial" panose="020B0604020202020204" pitchFamily="34" charset="0"/>
+              <a:buChar char="•"/>
+            </a:pPr>
+            <a:endParaRPr lang="en-US" dirty="0"/>
+          </a:p>
+          <a:p>
+            <a:pPr marL="342900" indent="-342900">
+              <a:buFont typeface="Arial" panose="020B0604020202020204" pitchFamily="34" charset="0"/>
+              <a:buChar char="•"/>
+            </a:pPr>
+            <a:r>
+              <a:rPr lang="en-US" dirty="0" smtClean="0"/>
+              <a:t>In object:</a:t>
+            </a:r>
+          </a:p>
+          <a:p>
+            <a:pPr marL="608013" lvl="1" indent="-342900">
+              <a:buFont typeface="Arial" panose="020B0604020202020204" pitchFamily="34" charset="0"/>
+              <a:buChar char="•"/>
+            </a:pPr>
+            <a:r>
+              <a:rPr lang="en-US" dirty="0" err="1" smtClean="0"/>
+              <a:t>obj.someProperty</a:t>
+            </a:r>
+            <a:endParaRPr lang="en-US" dirty="0" smtClean="0"/>
+          </a:p>
+          <a:p>
+            <a:pPr marL="608013" lvl="1" indent="-342900">
+              <a:buFont typeface="Arial" panose="020B0604020202020204" pitchFamily="34" charset="0"/>
+              <a:buChar char="•"/>
+            </a:pPr>
+            <a:r>
+              <a:rPr lang="en-US" dirty="0" err="1" smtClean="0"/>
+              <a:t>obj</a:t>
+            </a:r>
+            <a:r>
+              <a:rPr lang="en-US" dirty="0" smtClean="0"/>
+              <a:t>[“</a:t>
+            </a:r>
+            <a:r>
+              <a:rPr lang="en-US" dirty="0" err="1" smtClean="0"/>
+              <a:t>someProperty</a:t>
+            </a:r>
+            <a:r>
+              <a:rPr lang="en-US" dirty="0" smtClean="0"/>
+              <a:t>”]</a:t>
+            </a:r>
+          </a:p>
+          <a:p>
+            <a:pPr marL="608013" lvl="1" indent="-342900">
+              <a:buFont typeface="Arial" panose="020B0604020202020204" pitchFamily="34" charset="0"/>
+              <a:buChar char="•"/>
+            </a:pPr>
+            <a:r>
+              <a:rPr lang="en-US" dirty="0" smtClean="0"/>
+              <a:t>Objects are hash maps as well</a:t>
+            </a:r>
+          </a:p>
+        </p:txBody>
+      </p:sp>
+      <p:sp>
+        <p:nvSpPr>
+          <p:cNvPr id="4" name="Date Placeholder 3"/>
+          <p:cNvSpPr>
+            <a:spLocks noGrp="1"/>
+          </p:cNvSpPr>
+          <p:nvPr>
+            <p:ph type="dt" sz="half" idx="10"/>
+          </p:nvPr>
+        </p:nvSpPr>
+        <p:spPr/>
+        <p:txBody>
+          <a:bodyPr/>
+          <a:lstStyle/>
+          <a:p>
+            <a:r>
+              <a:rPr lang="en-US" dirty="0" smtClean="0"/>
+              <a:t>14. August 2015</a:t>
+            </a:r>
+            <a:endParaRPr lang="en-US" dirty="0"/>
+          </a:p>
+        </p:txBody>
+      </p:sp>
+      <p:sp>
+        <p:nvSpPr>
+          <p:cNvPr id="6" name="Text Placeholder 5"/>
+          <p:cNvSpPr>
+            <a:spLocks noGrp="1"/>
+          </p:cNvSpPr>
+          <p:nvPr>
+            <p:ph type="body" sz="quarter" idx="13"/>
+          </p:nvPr>
+        </p:nvSpPr>
+        <p:spPr/>
+        <p:txBody>
+          <a:bodyPr/>
+          <a:lstStyle/>
+          <a:p>
             <a:endParaRPr lang="en-US" dirty="0"/>
           </a:p>
         </p:txBody>
@@ -10109,10 +11407,18 @@
           <a:lstStyle/>
           <a:p>
             <a:r>
-              <a:rPr lang="en-US" dirty="0" smtClean="0"/>
-              <a:t>Member</a:t>
-            </a:r>
-            <a:endParaRPr lang="en-US" dirty="0"/>
+              <a:rPr lang="en-GB" b="1" dirty="0" err="1" smtClean="0"/>
+              <a:t>typeof</a:t>
+            </a:r>
+            <a:r>
+              <a:rPr lang="en-GB" b="1" dirty="0" smtClean="0"/>
+              <a:t>  </a:t>
+            </a:r>
+            <a:r>
+              <a:rPr lang="en-GB" dirty="0" smtClean="0"/>
+              <a:t>operator</a:t>
+            </a:r>
+            <a:endParaRPr lang="en-US" b="1" dirty="0"/>
           </a:p>
         </p:txBody>
       </p:sp>
@@ -10137,81 +11443,40 @@
             </a:pPr>
             <a:r>
               <a:rPr lang="en-US" dirty="0" smtClean="0"/>
-              <a:t>In array</a:t>
-            </a:r>
-            <a:r>
-              <a:rPr lang="en-US" dirty="0" smtClean="0"/>
-              <a:t>: </a:t>
-            </a:r>
-            <a:r>
-              <a:rPr lang="en-US" dirty="0" err="1" smtClean="0"/>
-              <a:t>arr</a:t>
-            </a:r>
-            <a:r>
-              <a:rPr lang="en-US" dirty="0" smtClean="0"/>
-              <a:t>[4]</a:t>
-            </a:r>
+              <a:t>Returns a string</a:t>
+            </a:r>
+            <a:endParaRPr lang="en-US" dirty="0"/>
           </a:p>
           <a:p>
             <a:pPr marL="342900" indent="-342900">
               <a:buFont typeface="Arial" panose="020B0604020202020204" pitchFamily="34" charset="0"/>
               <a:buChar char="•"/>
             </a:pPr>
+            <a:r>
+              <a:rPr lang="en-US" dirty="0" err="1" smtClean="0"/>
+              <a:t>typeof</a:t>
+            </a:r>
+            <a:r>
+              <a:rPr lang="en-US" dirty="0" smtClean="0"/>
+              <a:t> </a:t>
+            </a:r>
+            <a:r>
+              <a:rPr lang="en-US" dirty="0"/>
+              <a:t>37 === 'number</a:t>
+            </a:r>
+            <a:r>
+              <a:rPr lang="en-US" dirty="0" smtClean="0"/>
+              <a:t>';</a:t>
+            </a:r>
+          </a:p>
+          <a:p>
+            <a:endParaRPr lang="en-US" dirty="0" smtClean="0"/>
+          </a:p>
+          <a:p>
             <a:endParaRPr lang="en-US" dirty="0"/>
           </a:p>
           <a:p>
-            <a:pPr marL="342900" indent="-342900">
-              <a:buFont typeface="Arial" panose="020B0604020202020204" pitchFamily="34" charset="0"/>
-              <a:buChar char="•"/>
-            </a:pPr>
-            <a:r>
-              <a:rPr lang="en-US" dirty="0" smtClean="0"/>
-              <a:t>In object:</a:t>
-            </a:r>
-          </a:p>
-          <a:p>
-            <a:pPr marL="608013" lvl="1" indent="-342900">
-              <a:buFont typeface="Arial" panose="020B0604020202020204" pitchFamily="34" charset="0"/>
-              <a:buChar char="•"/>
-            </a:pPr>
-            <a:r>
-              <a:rPr lang="en-US" dirty="0" err="1" smtClean="0"/>
-              <a:t>obj.someProperty</a:t>
-            </a:r>
-            <a:endParaRPr lang="en-US" dirty="0" smtClean="0"/>
-          </a:p>
-          <a:p>
-            <a:pPr marL="608013" lvl="1" indent="-342900">
-              <a:buFont typeface="Arial" panose="020B0604020202020204" pitchFamily="34" charset="0"/>
-              <a:buChar char="•"/>
-            </a:pPr>
-            <a:r>
-              <a:rPr lang="en-US" dirty="0" err="1" smtClean="0"/>
-              <a:t>obj</a:t>
-            </a:r>
-            <a:r>
-              <a:rPr lang="en-US" dirty="0" smtClean="0"/>
-              <a:t>[“</a:t>
-            </a:r>
-            <a:r>
-              <a:rPr lang="en-US" dirty="0" err="1" smtClean="0"/>
-              <a:t>someProperty</a:t>
-            </a:r>
-            <a:r>
-              <a:rPr lang="en-US" dirty="0" smtClean="0"/>
-              <a:t>”]</a:t>
-            </a:r>
-          </a:p>
-          <a:p>
-            <a:pPr marL="608013" lvl="1" indent="-342900">
-              <a:buFont typeface="Arial" panose="020B0604020202020204" pitchFamily="34" charset="0"/>
-              <a:buChar char="•"/>
-            </a:pPr>
-            <a:r>
-              <a:rPr lang="en-US" dirty="0" smtClean="0"/>
-              <a:t>Objects are hash maps as well</a:t>
-            </a:r>
-            <a:endParaRPr lang="en-US" dirty="0" smtClean="0"/>
+            <a:endParaRPr lang="en-US" dirty="0"/>
           </a:p>
         </p:txBody>
       </p:sp>
@@ -10327,238 +11592,6 @@
               <a:rPr smtClean="0"/>
               <a:pPr/>
               <a:t>8</a:t>
-            </a:fld>
-            <a:endParaRPr dirty="0"/>
-          </a:p>
-        </p:txBody>
-      </p:sp>
-    </p:spTree>
-    <p:extLst>
-      <p:ext uri="{BB962C8B-B14F-4D97-AF65-F5344CB8AC3E}">
-        <p14:creationId xmlns:p14="http://schemas.microsoft.com/office/powerpoint/2010/main" val="2884851122"/>
-      </p:ext>
-    </p:extLst>
-  </p:cSld>
-  <p:clrMapOvr>
-    <a:masterClrMapping/>
-  </p:clrMapOvr>
-</p:sld>
-</file>
-
-<file path=ppt/slides/slide9.xml><?xml version="1.0" encoding="utf-8"?>
-<p:sld xmlns:a="http://schemas.openxmlformats.org/drawingml/2006/main" xmlns:r="http://schemas.openxmlformats.org/officeDocument/2006/relationships" xmlns:p="http://schemas.openxmlformats.org/presentationml/2006/main">
-  <p:cSld>
-    <p:spTree>
-      <p:nvGrpSpPr>
-        <p:cNvPr id="1" name=""/>
-        <p:cNvGrpSpPr/>
-        <p:nvPr/>
-      </p:nvGrpSpPr>
-      <p:grpSpPr>
-        <a:xfrm>
-          <a:off x="0" y="0"/>
-          <a:ext cx="0" cy="0"/>
-          <a:chOff x="0" y="0"/>
-          <a:chExt cx="0" cy="0"/>
-        </a:xfrm>
-      </p:grpSpPr>
-      <p:sp>
-        <p:nvSpPr>
-          <p:cNvPr id="2" name="Title 1"/>
-          <p:cNvSpPr>
-            <a:spLocks noGrp="1"/>
-          </p:cNvSpPr>
-          <p:nvPr>
-            <p:ph type="title"/>
-          </p:nvPr>
-        </p:nvSpPr>
-        <p:spPr/>
-        <p:txBody>
-          <a:bodyPr/>
-          <a:lstStyle/>
-          <a:p>
-            <a:r>
-              <a:rPr lang="en-GB" dirty="0" err="1" smtClean="0"/>
-              <a:t>typeof</a:t>
-            </a:r>
-            <a:r>
-              <a:rPr lang="en-GB" dirty="0" smtClean="0"/>
-              <a:t> </a:t>
-            </a:r>
-            <a:endParaRPr lang="en-US" dirty="0"/>
-          </a:p>
-        </p:txBody>
-      </p:sp>
-      <p:sp>
-        <p:nvSpPr>
-          <p:cNvPr id="3" name="Content Placeholder 2"/>
-          <p:cNvSpPr>
-            <a:spLocks noGrp="1"/>
-          </p:cNvSpPr>
-          <p:nvPr>
-            <p:ph idx="1"/>
-          </p:nvPr>
-        </p:nvSpPr>
-        <p:spPr/>
-        <p:txBody>
-          <a:bodyPr/>
-          <a:lstStyle/>
-          <a:p>
-            <a:pPr marL="342900" indent="-342900">
-              <a:buFont typeface="Arial" panose="020B0604020202020204" pitchFamily="34" charset="0"/>
-              <a:buChar char="•"/>
-            </a:pPr>
-            <a:r>
-              <a:rPr lang="en-US" dirty="0" smtClean="0"/>
-              <a:t>Returns a string</a:t>
-            </a:r>
-            <a:endParaRPr lang="en-US" dirty="0"/>
-          </a:p>
-          <a:p>
-            <a:pPr marL="342900" indent="-342900">
-              <a:buFont typeface="Arial" panose="020B0604020202020204" pitchFamily="34" charset="0"/>
-              <a:buChar char="•"/>
-            </a:pPr>
-            <a:r>
-              <a:rPr lang="en-US" dirty="0" err="1" smtClean="0"/>
-              <a:t>typeof</a:t>
-            </a:r>
-            <a:r>
-              <a:rPr lang="en-US" dirty="0" smtClean="0"/>
-              <a:t> </a:t>
-            </a:r>
-            <a:r>
-              <a:rPr lang="en-US" dirty="0"/>
-              <a:t>37 === 'number</a:t>
-            </a:r>
-            <a:r>
-              <a:rPr lang="en-US" dirty="0" smtClean="0"/>
-              <a:t>';</a:t>
-            </a:r>
-          </a:p>
-          <a:p>
-            <a:endParaRPr lang="en-US" dirty="0" smtClean="0"/>
-          </a:p>
-          <a:p>
-            <a:endParaRPr lang="en-US" dirty="0"/>
-          </a:p>
-          <a:p>
-            <a:endParaRPr lang="en-US" dirty="0"/>
-          </a:p>
-        </p:txBody>
-      </p:sp>
-      <p:sp>
-        <p:nvSpPr>
-          <p:cNvPr id="4" name="Date Placeholder 3"/>
-          <p:cNvSpPr>
-            <a:spLocks noGrp="1"/>
-          </p:cNvSpPr>
-          <p:nvPr>
-            <p:ph type="dt" sz="half" idx="10"/>
-          </p:nvPr>
-        </p:nvSpPr>
-        <p:spPr/>
-        <p:txBody>
-          <a:bodyPr/>
-          <a:lstStyle/>
-          <a:p>
-            <a:r>
-              <a:rPr lang="en-US" dirty="0" smtClean="0"/>
-              <a:t>14. August 2015</a:t>
-            </a:r>
-            <a:endParaRPr lang="en-US" dirty="0"/>
-          </a:p>
-        </p:txBody>
-      </p:sp>
-      <p:sp>
-        <p:nvSpPr>
-          <p:cNvPr id="6" name="Text Placeholder 5"/>
-          <p:cNvSpPr>
-            <a:spLocks noGrp="1"/>
-          </p:cNvSpPr>
-          <p:nvPr>
-            <p:ph type="body" sz="quarter" idx="13"/>
-          </p:nvPr>
-        </p:nvSpPr>
-        <p:spPr/>
-        <p:txBody>
-          <a:bodyPr/>
-          <a:lstStyle/>
-          <a:p>
-            <a:endParaRPr lang="en-US" dirty="0"/>
-          </a:p>
-        </p:txBody>
-      </p:sp>
-      <p:sp>
-        <p:nvSpPr>
-          <p:cNvPr id="7" name="Footer Placeholder 6"/>
-          <p:cNvSpPr>
-            <a:spLocks noGrp="1"/>
-          </p:cNvSpPr>
-          <p:nvPr>
-            <p:ph type="ftr" sz="quarter" idx="11"/>
-          </p:nvPr>
-        </p:nvSpPr>
-        <p:spPr/>
-        <p:txBody>
-          <a:bodyPr/>
-          <a:lstStyle/>
-          <a:p>
-            <a:r>
-              <a:rPr lang="en-US" dirty="0" err="1" smtClean="0"/>
-              <a:t>Javascript</a:t>
-            </a:r>
-            <a:r>
-              <a:rPr lang="en-US" dirty="0" smtClean="0"/>
-              <a:t> Basics | </a:t>
-            </a:r>
-            <a:r>
-              <a:rPr lang="en-US" dirty="0" err="1" smtClean="0"/>
-              <a:t>nesp</a:t>
-            </a:r>
-            <a:r>
-              <a:rPr lang="en-US" dirty="0" smtClean="0"/>
-              <a:t>, </a:t>
-            </a:r>
-            <a:r>
-              <a:rPr lang="en-US" dirty="0" err="1" smtClean="0"/>
-              <a:t>stmi</a:t>
-            </a:r>
-            <a:r>
-              <a:rPr lang="en-US" dirty="0" smtClean="0"/>
-              <a:t>, </a:t>
-            </a:r>
-            <a:r>
-              <a:rPr lang="en-US" dirty="0" err="1" smtClean="0"/>
-              <a:t>mabo</a:t>
-            </a:r>
-            <a:endParaRPr lang="en-US" dirty="0"/>
-          </a:p>
-        </p:txBody>
-      </p:sp>
-      <p:sp>
-        <p:nvSpPr>
-          <p:cNvPr id="9" name="Slide Number Placeholder 8"/>
-          <p:cNvSpPr>
-            <a:spLocks noGrp="1"/>
-          </p:cNvSpPr>
-          <p:nvPr>
-            <p:ph type="sldNum" sz="quarter" idx="12"/>
-          </p:nvPr>
-        </p:nvSpPr>
-        <p:spPr/>
-        <p:txBody>
-          <a:bodyPr/>
-          <a:lstStyle/>
-          <a:p>
-            <a:r>
-              <a:rPr lang="en-GB" smtClean="0"/>
-              <a:t>Slide </a:t>
-            </a:r>
-            <a:fld id="{B945A87F-2CE4-4B6D-B6BF-F6BF6C5CB292}" type="slidenum">
-              <a:rPr smtClean="0"/>
-              <a:pPr/>
-              <a:t>9</a:t>
             </a:fld>
             <a:endParaRPr dirty="0"/>
           </a:p>
@@ -11533,6 +12566,286 @@
           </a:graphicData>
         </a:graphic>
       </p:graphicFrame>
+    </p:spTree>
+    <p:extLst>
+      <p:ext uri="{BB962C8B-B14F-4D97-AF65-F5344CB8AC3E}">
+        <p14:creationId xmlns:p14="http://schemas.microsoft.com/office/powerpoint/2010/main" val="2884851122"/>
+      </p:ext>
+    </p:extLst>
+  </p:cSld>
+  <p:clrMapOvr>
+    <a:masterClrMapping/>
+  </p:clrMapOvr>
+</p:sld>
+</file>
+
+<file path=ppt/slides/slide9.xml><?xml version="1.0" encoding="utf-8"?>
+<p:sld xmlns:a="http://schemas.openxmlformats.org/drawingml/2006/main" xmlns:r="http://schemas.openxmlformats.org/officeDocument/2006/relationships" xmlns:p="http://schemas.openxmlformats.org/presentationml/2006/main">
+  <p:cSld>
+    <p:spTree>
+      <p:nvGrpSpPr>
+        <p:cNvPr id="1" name=""/>
+        <p:cNvGrpSpPr/>
+        <p:nvPr/>
+      </p:nvGrpSpPr>
+      <p:grpSpPr>
+        <a:xfrm>
+          <a:off x="0" y="0"/>
+          <a:ext cx="0" cy="0"/>
+          <a:chOff x="0" y="0"/>
+          <a:chExt cx="0" cy="0"/>
+        </a:xfrm>
+      </p:grpSpPr>
+      <p:sp>
+        <p:nvSpPr>
+          <p:cNvPr id="2" name="Title 1"/>
+          <p:cNvSpPr>
+            <a:spLocks noGrp="1"/>
+          </p:cNvSpPr>
+          <p:nvPr>
+            <p:ph type="title"/>
+          </p:nvPr>
+        </p:nvSpPr>
+        <p:spPr/>
+        <p:txBody>
+          <a:bodyPr/>
+          <a:lstStyle/>
+          <a:p>
+            <a:r>
+              <a:rPr lang="en-US" b="1" dirty="0" smtClean="0"/>
+              <a:t>delete</a:t>
+            </a:r>
+            <a:r>
+              <a:rPr lang="en-US" dirty="0" smtClean="0"/>
+              <a:t>, </a:t>
+            </a:r>
+            <a:r>
+              <a:rPr lang="en-US" b="1" dirty="0" smtClean="0"/>
+              <a:t>in</a:t>
+            </a:r>
+            <a:endParaRPr lang="en-US" b="1" dirty="0"/>
+          </a:p>
+        </p:txBody>
+      </p:sp>
+      <p:sp>
+        <p:nvSpPr>
+          <p:cNvPr id="3" name="Content Placeholder 2"/>
+          <p:cNvSpPr>
+            <a:spLocks noGrp="1"/>
+          </p:cNvSpPr>
+          <p:nvPr>
+            <p:ph idx="1"/>
+          </p:nvPr>
+        </p:nvSpPr>
+        <p:spPr/>
+        <p:txBody>
+          <a:bodyPr/>
+          <a:lstStyle/>
+          <a:p>
+            <a:pPr marL="342900" indent="-342900">
+              <a:buFont typeface="Arial" panose="020B0604020202020204" pitchFamily="34" charset="0"/>
+              <a:buChar char="•"/>
+            </a:pPr>
+            <a:r>
+              <a:rPr lang="en-US" b="1" dirty="0" smtClean="0"/>
+              <a:t>delete</a:t>
+            </a:r>
+            <a:r>
+              <a:rPr lang="en-US" dirty="0" smtClean="0"/>
+              <a:t> removes a property or an element from the array</a:t>
+            </a:r>
+            <a:endParaRPr lang="en-US" b="1" dirty="0" smtClean="0"/>
+          </a:p>
+          <a:p>
+            <a:pPr marL="608013" lvl="1" indent="-342900">
+              <a:buFont typeface="Arial" panose="020B0604020202020204" pitchFamily="34" charset="0"/>
+              <a:buChar char="•"/>
+            </a:pPr>
+            <a:r>
+              <a:rPr lang="en-US" dirty="0" smtClean="0"/>
+              <a:t>delete </a:t>
+            </a:r>
+            <a:r>
+              <a:rPr lang="en-US" dirty="0" err="1"/>
+              <a:t>object.property</a:t>
+            </a:r>
+            <a:endParaRPr lang="en-US" dirty="0"/>
+          </a:p>
+          <a:p>
+            <a:pPr marL="608013" lvl="1" indent="-342900">
+              <a:buFont typeface="Arial" panose="020B0604020202020204" pitchFamily="34" charset="0"/>
+              <a:buChar char="•"/>
+            </a:pPr>
+            <a:r>
+              <a:rPr lang="en-US" dirty="0"/>
+              <a:t>delete object['property</a:t>
+            </a:r>
+            <a:r>
+              <a:rPr lang="en-US" dirty="0" smtClean="0"/>
+              <a:t>']</a:t>
+            </a:r>
+          </a:p>
+          <a:p>
+            <a:endParaRPr lang="en-US" dirty="0"/>
+          </a:p>
+          <a:p>
+            <a:pPr marL="342900" indent="-342900">
+              <a:buFont typeface="Arial" panose="020B0604020202020204" pitchFamily="34" charset="0"/>
+              <a:buChar char="•"/>
+            </a:pPr>
+            <a:r>
+              <a:rPr lang="en-US" b="1" dirty="0" smtClean="0"/>
+              <a:t>in</a:t>
+            </a:r>
+            <a:r>
+              <a:rPr lang="en-US" dirty="0" smtClean="0"/>
+              <a:t> checks if a property exists </a:t>
+            </a:r>
+            <a:r>
+              <a:rPr lang="en-US" dirty="0" smtClean="0"/>
+              <a:t>on an object, or if an element exists in an array</a:t>
+            </a:r>
+          </a:p>
+          <a:p>
+            <a:pPr marL="608013" lvl="1" indent="-342900">
+              <a:buFont typeface="Arial" panose="020B0604020202020204" pitchFamily="34" charset="0"/>
+              <a:buChar char="•"/>
+            </a:pPr>
+            <a:r>
+              <a:rPr lang="en-US" dirty="0" smtClean="0"/>
+              <a:t>if (property in object)</a:t>
+            </a:r>
+          </a:p>
+          <a:p>
+            <a:pPr marL="608013" lvl="1" indent="-342900">
+              <a:buFont typeface="Arial" panose="020B0604020202020204" pitchFamily="34" charset="0"/>
+              <a:buChar char="•"/>
+            </a:pPr>
+            <a:r>
+              <a:rPr lang="en-US" dirty="0" smtClean="0"/>
+              <a:t>if (item in array)</a:t>
+            </a:r>
+            <a:endParaRPr lang="en-US" dirty="0"/>
+          </a:p>
+        </p:txBody>
+      </p:sp>
+      <p:sp>
+        <p:nvSpPr>
+          <p:cNvPr id="4" name="Date Placeholder 3"/>
+          <p:cNvSpPr>
+            <a:spLocks noGrp="1"/>
+          </p:cNvSpPr>
+          <p:nvPr>
+            <p:ph type="dt" sz="half" idx="10"/>
+          </p:nvPr>
+        </p:nvSpPr>
+        <p:spPr/>
+        <p:txBody>
+          <a:bodyPr/>
+          <a:lstStyle/>
+          <a:p>
+            <a:r>
+              <a:rPr lang="en-US" dirty="0" smtClean="0"/>
+              <a:t>14. August 2015</a:t>
+            </a:r>
+            <a:endParaRPr lang="en-US" dirty="0"/>
+          </a:p>
+        </p:txBody>
+      </p:sp>
+      <p:sp>
+        <p:nvSpPr>
+          <p:cNvPr id="6" name="Text Placeholder 5"/>
+          <p:cNvSpPr>
+            <a:spLocks noGrp="1"/>
+          </p:cNvSpPr>
+          <p:nvPr>
+            <p:ph type="body" sz="quarter" idx="13"/>
+          </p:nvPr>
+        </p:nvSpPr>
+        <p:spPr/>
+        <p:txBody>
+          <a:bodyPr/>
+          <a:lstStyle/>
+          <a:p>
+            <a:endParaRPr lang="en-US" dirty="0"/>
+          </a:p>
+        </p:txBody>
+      </p:sp>
+      <p:sp>
+        <p:nvSpPr>
+          <p:cNvPr id="7" name="Footer Placeholder 6"/>
+          <p:cNvSpPr>
+            <a:spLocks noGrp="1"/>
+          </p:cNvSpPr>
+          <p:nvPr>
+            <p:ph type="ftr" sz="quarter" idx="11"/>
+          </p:nvPr>
+        </p:nvSpPr>
+        <p:spPr/>
+        <p:txBody>
+          <a:bodyPr/>
+          <a:lstStyle/>
+          <a:p>
+            <a:r>
+              <a:rPr lang="en-US" dirty="0" err="1" smtClean="0"/>
+              <a:t>Javascript</a:t>
+            </a:r>
+            <a:r>
+              <a:rPr lang="en-US" dirty="0" smtClean="0"/>
+              <a:t> Basics | </a:t>
+            </a:r>
+            <a:r>
+              <a:rPr lang="en-US" dirty="0" err="1" smtClean="0"/>
+              <a:t>nesp</a:t>
+            </a:r>
+            <a:r>
+              <a:rPr lang="en-US" dirty="0" smtClean="0"/>
+              <a:t>, </a:t>
+            </a:r>
+            <a:r>
+              <a:rPr lang="en-US" dirty="0" err="1" smtClean="0"/>
+              <a:t>stmi</a:t>
+            </a:r>
+            <a:r>
+              <a:rPr lang="en-US" dirty="0" smtClean="0"/>
+              <a:t>, </a:t>
+            </a:r>
+            <a:r>
+              <a:rPr lang="en-US" dirty="0" err="1" smtClean="0"/>
+              <a:t>mabo</a:t>
+            </a:r>
+            <a:endParaRPr lang="en-US" dirty="0"/>
+          </a:p>
+        </p:txBody>
+      </p:sp>
+      <p:sp>
+        <p:nvSpPr>
+          <p:cNvPr id="9" name="Slide Number Placeholder 8"/>
+          <p:cNvSpPr>
+            <a:spLocks noGrp="1"/>
+          </p:cNvSpPr>
+          <p:nvPr>
+            <p:ph type="sldNum" sz="quarter" idx="12"/>
+          </p:nvPr>
+        </p:nvSpPr>
+        <p:spPr/>
+        <p:txBody>
+          <a:bodyPr/>
+          <a:lstStyle/>
+          <a:p>
+            <a:r>
+              <a:rPr lang="en-GB" smtClean="0"/>
+              <a:t>Slide </a:t>
+            </a:r>
+            <a:fld id="{B945A87F-2CE4-4B6D-B6BF-F6BF6C5CB292}" type="slidenum">
+              <a:rPr smtClean="0"/>
+              <a:pPr/>
+              <a:t>9</a:t>
+            </a:fld>
+            <a:endParaRPr dirty="0"/>
+          </a:p>
+        </p:txBody>
+      </p:sp>
     </p:spTree>
     <p:extLst>
       <p:ext uri="{BB962C8B-B14F-4D97-AF65-F5344CB8AC3E}">

</xml_diff>